<commit_message>
Added Practical Arduino Ground Up
</commit_message>
<xml_diff>
--- a/Introduction to Class Programming Part 2.pptx
+++ b/Introduction to Class Programming Part 2.pptx
@@ -238,7 +238,7 @@
           <a:p>
             <a:fld id="{C8D18E60-4300-4729-A0D7-6AB984C3922D}" type="datetimeFigureOut">
               <a:rPr lang="en-US" smtClean="0"/>
-              <a:t>12/12/2021</a:t>
+              <a:t>12/14/2021</a:t>
             </a:fld>
             <a:endParaRPr lang="en-US"/>
           </a:p>
@@ -1006,7 +1006,10 @@
           <a:bodyPr/>
           <a:lstStyle/>
           <a:p>
-            <a:endParaRPr lang="en-US" dirty="0"/>
+            <a:r>
+              <a:rPr lang="en-US" dirty="0"/>
+              <a:t>Full Code of Header</a:t>
+            </a:r>
           </a:p>
         </p:txBody>
       </p:sp>
@@ -1090,32 +1093,29 @@
           <a:bodyPr/>
           <a:lstStyle/>
           <a:p>
+            <a:pPr marL="0" marR="0" lvl="0" indent="0" algn="l" defTabSz="914400" rtl="0" eaLnBrk="1" fontAlgn="auto" latinLnBrk="0" hangingPunct="1">
+              <a:lnSpc>
+                <a:spcPct val="100000"/>
+              </a:lnSpc>
+              <a:spcBef>
+                <a:spcPts val="0"/>
+              </a:spcBef>
+              <a:spcAft>
+                <a:spcPts val="0"/>
+              </a:spcAft>
+              <a:buClrTx/>
+              <a:buSzTx/>
+              <a:buFontTx/>
+              <a:buNone/>
+              <a:tabLst/>
+              <a:defRPr/>
+            </a:pPr>
             <a:r>
               <a:rPr lang="en-US" dirty="0"/>
-              <a:t>Share screen show code … load code   wink over to second camera describe what people are seeing.</a:t>
-            </a:r>
-          </a:p>
-          <a:p>
-            <a:r>
-              <a:rPr lang="en-US" dirty="0"/>
-              <a:t>Change timing and show effect. Pause for discussion.</a:t>
-            </a:r>
-          </a:p>
-          <a:p>
-            <a:r>
-              <a:rPr lang="en-US" dirty="0"/>
-              <a:t>Look into class code – discuss how it works.</a:t>
-            </a:r>
-          </a:p>
-          <a:p>
-            <a:r>
-              <a:rPr lang="en-US" dirty="0"/>
-              <a:t>Move to </a:t>
-            </a:r>
-            <a:r>
-              <a:rPr lang="en-US"/>
-              <a:t>next example.</a:t>
-            </a:r>
+              <a:t>Full Code of Class Program</a:t>
+            </a:r>
+          </a:p>
+          <a:p>
             <a:endParaRPr lang="en-US" dirty="0"/>
           </a:p>
         </p:txBody>
@@ -1137,7 +1137,7 @@
           <a:p>
             <a:fld id="{AF533E96-F078-4B3D-A8F4-F1AF21EBC357}" type="slidenum">
               <a:rPr lang="en-US" smtClean="0"/>
-              <a:t>21</a:t>
+              <a:t>18</a:t>
             </a:fld>
             <a:endParaRPr lang="en-US"/>
           </a:p>
@@ -1146,7 +1146,7 @@
     </p:spTree>
     <p:extLst>
       <p:ext uri="{BB962C8B-B14F-4D97-AF65-F5344CB8AC3E}">
-        <p14:creationId xmlns:p14="http://schemas.microsoft.com/office/powerpoint/2010/main" val="673223152"/>
+        <p14:creationId xmlns:p14="http://schemas.microsoft.com/office/powerpoint/2010/main" val="3682502189"/>
       </p:ext>
     </p:extLst>
   </p:cSld>
@@ -1201,8 +1201,30 @@
           <a:lstStyle/>
           <a:p>
             <a:r>
-              <a:rPr lang="en-US" sz="1200" dirty="0"/>
-              <a:t>Can take a look at and talk through the code</a:t>
+              <a:rPr lang="en-US" dirty="0"/>
+              <a:t>Share screen show code … load code   wink over to second camera describe what people are seeing.</a:t>
+            </a:r>
+          </a:p>
+          <a:p>
+            <a:r>
+              <a:rPr lang="en-US" dirty="0"/>
+              <a:t>Change timing and show effect. Pause for discussion.</a:t>
+            </a:r>
+          </a:p>
+          <a:p>
+            <a:r>
+              <a:rPr lang="en-US" dirty="0"/>
+              <a:t>Look into class code – discuss how it works.</a:t>
+            </a:r>
+          </a:p>
+          <a:p>
+            <a:r>
+              <a:rPr lang="en-US" dirty="0"/>
+              <a:t>Move to </a:t>
+            </a:r>
+            <a:r>
+              <a:rPr lang="en-US"/>
+              <a:t>next example.</a:t>
             </a:r>
             <a:endParaRPr lang="en-US" dirty="0"/>
           </a:p>
@@ -1225,7 +1247,7 @@
           <a:p>
             <a:fld id="{AF533E96-F078-4B3D-A8F4-F1AF21EBC357}" type="slidenum">
               <a:rPr lang="en-US" smtClean="0"/>
-              <a:t>22</a:t>
+              <a:t>21</a:t>
             </a:fld>
             <a:endParaRPr lang="en-US"/>
           </a:p>
@@ -1234,7 +1256,7 @@
     </p:spTree>
     <p:extLst>
       <p:ext uri="{BB962C8B-B14F-4D97-AF65-F5344CB8AC3E}">
-        <p14:creationId xmlns:p14="http://schemas.microsoft.com/office/powerpoint/2010/main" val="284462857"/>
+        <p14:creationId xmlns:p14="http://schemas.microsoft.com/office/powerpoint/2010/main" val="673223152"/>
       </p:ext>
     </p:extLst>
   </p:cSld>
@@ -1288,6 +1310,10 @@
           <a:bodyPr/>
           <a:lstStyle/>
           <a:p>
+            <a:r>
+              <a:rPr lang="en-US" sz="1200" dirty="0"/>
+              <a:t>Can take a look at and talk through the code</a:t>
+            </a:r>
             <a:endParaRPr lang="en-US" dirty="0"/>
           </a:p>
         </p:txBody>
@@ -1309,6 +1335,90 @@
           <a:p>
             <a:fld id="{AF533E96-F078-4B3D-A8F4-F1AF21EBC357}" type="slidenum">
               <a:rPr lang="en-US" smtClean="0"/>
+              <a:t>22</a:t>
+            </a:fld>
+            <a:endParaRPr lang="en-US"/>
+          </a:p>
+        </p:txBody>
+      </p:sp>
+    </p:spTree>
+    <p:extLst>
+      <p:ext uri="{BB962C8B-B14F-4D97-AF65-F5344CB8AC3E}">
+        <p14:creationId xmlns:p14="http://schemas.microsoft.com/office/powerpoint/2010/main" val="284462857"/>
+      </p:ext>
+    </p:extLst>
+  </p:cSld>
+  <p:clrMapOvr>
+    <a:masterClrMapping/>
+  </p:clrMapOvr>
+</p:notes>
+</file>
+
+<file path=ppt/notesSlides/notesSlide17.xml><?xml version="1.0" encoding="utf-8"?>
+<p:notes xmlns:a="http://schemas.openxmlformats.org/drawingml/2006/main" xmlns:r="http://schemas.openxmlformats.org/officeDocument/2006/relationships" xmlns:p="http://schemas.openxmlformats.org/presentationml/2006/main">
+  <p:cSld>
+    <p:spTree>
+      <p:nvGrpSpPr>
+        <p:cNvPr id="1" name=""/>
+        <p:cNvGrpSpPr/>
+        <p:nvPr/>
+      </p:nvGrpSpPr>
+      <p:grpSpPr>
+        <a:xfrm>
+          <a:off x="0" y="0"/>
+          <a:ext cx="0" cy="0"/>
+          <a:chOff x="0" y="0"/>
+          <a:chExt cx="0" cy="0"/>
+        </a:xfrm>
+      </p:grpSpPr>
+      <p:sp>
+        <p:nvSpPr>
+          <p:cNvPr id="2" name="Slide Image Placeholder 1"/>
+          <p:cNvSpPr>
+            <a:spLocks noGrp="1" noRot="1" noChangeAspect="1"/>
+          </p:cNvSpPr>
+          <p:nvPr>
+            <p:ph type="sldImg"/>
+          </p:nvPr>
+        </p:nvSpPr>
+        <p:spPr/>
+      </p:sp>
+      <p:sp>
+        <p:nvSpPr>
+          <p:cNvPr id="3" name="Notes Placeholder 2"/>
+          <p:cNvSpPr>
+            <a:spLocks noGrp="1"/>
+          </p:cNvSpPr>
+          <p:nvPr>
+            <p:ph type="body" idx="1"/>
+          </p:nvPr>
+        </p:nvSpPr>
+        <p:spPr/>
+        <p:txBody>
+          <a:bodyPr/>
+          <a:lstStyle/>
+          <a:p>
+            <a:endParaRPr lang="en-US" dirty="0"/>
+          </a:p>
+        </p:txBody>
+      </p:sp>
+      <p:sp>
+        <p:nvSpPr>
+          <p:cNvPr id="4" name="Slide Number Placeholder 3"/>
+          <p:cNvSpPr>
+            <a:spLocks noGrp="1"/>
+          </p:cNvSpPr>
+          <p:nvPr>
+            <p:ph type="sldNum" sz="quarter" idx="5"/>
+          </p:nvPr>
+        </p:nvSpPr>
+        <p:spPr/>
+        <p:txBody>
+          <a:bodyPr/>
+          <a:lstStyle/>
+          <a:p>
+            <a:fld id="{AF533E96-F078-4B3D-A8F4-F1AF21EBC357}" type="slidenum">
+              <a:rPr lang="en-US" smtClean="0"/>
               <a:t>23</a:t>
             </a:fld>
             <a:endParaRPr lang="en-US"/>
@@ -1328,7 +1438,7 @@
 </p:notes>
 </file>
 
-<file path=ppt/notesSlides/notesSlide17.xml><?xml version="1.0" encoding="utf-8"?>
+<file path=ppt/notesSlides/notesSlide18.xml><?xml version="1.0" encoding="utf-8"?>
 <p:notes xmlns:a="http://schemas.openxmlformats.org/drawingml/2006/main" xmlns:r="http://schemas.openxmlformats.org/officeDocument/2006/relationships" xmlns:p="http://schemas.openxmlformats.org/presentationml/2006/main">
   <p:cSld>
     <p:spTree>
@@ -1520,90 +1630,6 @@
     <p:extLst>
       <p:ext uri="{BB962C8B-B14F-4D97-AF65-F5344CB8AC3E}">
         <p14:creationId xmlns:p14="http://schemas.microsoft.com/office/powerpoint/2010/main" val="3568054752"/>
-      </p:ext>
-    </p:extLst>
-  </p:cSld>
-  <p:clrMapOvr>
-    <a:masterClrMapping/>
-  </p:clrMapOvr>
-</p:notes>
-</file>
-
-<file path=ppt/notesSlides/notesSlide18.xml><?xml version="1.0" encoding="utf-8"?>
-<p:notes xmlns:a="http://schemas.openxmlformats.org/drawingml/2006/main" xmlns:r="http://schemas.openxmlformats.org/officeDocument/2006/relationships" xmlns:p="http://schemas.openxmlformats.org/presentationml/2006/main">
-  <p:cSld>
-    <p:spTree>
-      <p:nvGrpSpPr>
-        <p:cNvPr id="1" name=""/>
-        <p:cNvGrpSpPr/>
-        <p:nvPr/>
-      </p:nvGrpSpPr>
-      <p:grpSpPr>
-        <a:xfrm>
-          <a:off x="0" y="0"/>
-          <a:ext cx="0" cy="0"/>
-          <a:chOff x="0" y="0"/>
-          <a:chExt cx="0" cy="0"/>
-        </a:xfrm>
-      </p:grpSpPr>
-      <p:sp>
-        <p:nvSpPr>
-          <p:cNvPr id="2" name="Slide Image Placeholder 1"/>
-          <p:cNvSpPr>
-            <a:spLocks noGrp="1" noRot="1" noChangeAspect="1"/>
-          </p:cNvSpPr>
-          <p:nvPr>
-            <p:ph type="sldImg"/>
-          </p:nvPr>
-        </p:nvSpPr>
-        <p:spPr/>
-      </p:sp>
-      <p:sp>
-        <p:nvSpPr>
-          <p:cNvPr id="3" name="Notes Placeholder 2"/>
-          <p:cNvSpPr>
-            <a:spLocks noGrp="1"/>
-          </p:cNvSpPr>
-          <p:nvPr>
-            <p:ph type="body" idx="1"/>
-          </p:nvPr>
-        </p:nvSpPr>
-        <p:spPr/>
-        <p:txBody>
-          <a:bodyPr/>
-          <a:lstStyle/>
-          <a:p>
-            <a:endParaRPr lang="en-US" dirty="0"/>
-          </a:p>
-        </p:txBody>
-      </p:sp>
-      <p:sp>
-        <p:nvSpPr>
-          <p:cNvPr id="4" name="Slide Number Placeholder 3"/>
-          <p:cNvSpPr>
-            <a:spLocks noGrp="1"/>
-          </p:cNvSpPr>
-          <p:nvPr>
-            <p:ph type="sldNum" sz="quarter" idx="5"/>
-          </p:nvPr>
-        </p:nvSpPr>
-        <p:spPr/>
-        <p:txBody>
-          <a:bodyPr/>
-          <a:lstStyle/>
-          <a:p>
-            <a:fld id="{AF533E96-F078-4B3D-A8F4-F1AF21EBC357}" type="slidenum">
-              <a:rPr lang="en-US" smtClean="0"/>
-              <a:t>27</a:t>
-            </a:fld>
-            <a:endParaRPr lang="en-US"/>
-          </a:p>
-        </p:txBody>
-      </p:sp>
-    </p:spTree>
-    <p:extLst>
-      <p:ext uri="{BB962C8B-B14F-4D97-AF65-F5344CB8AC3E}">
-        <p14:creationId xmlns:p14="http://schemas.microsoft.com/office/powerpoint/2010/main" val="2673887821"/>
       </p:ext>
     </p:extLst>
   </p:cSld>
@@ -1678,7 +1704,7 @@
           <a:p>
             <a:fld id="{AF533E96-F078-4B3D-A8F4-F1AF21EBC357}" type="slidenum">
               <a:rPr lang="en-US" smtClean="0"/>
-              <a:t>29</a:t>
+              <a:t>27</a:t>
             </a:fld>
             <a:endParaRPr lang="en-US"/>
           </a:p>
@@ -1687,7 +1713,7 @@
     </p:spTree>
     <p:extLst>
       <p:ext uri="{BB962C8B-B14F-4D97-AF65-F5344CB8AC3E}">
-        <p14:creationId xmlns:p14="http://schemas.microsoft.com/office/powerpoint/2010/main" val="1128629912"/>
+        <p14:creationId xmlns:p14="http://schemas.microsoft.com/office/powerpoint/2010/main" val="2673887821"/>
       </p:ext>
     </p:extLst>
   </p:cSld>
@@ -1857,6 +1883,90 @@
             <a:spLocks noGrp="1"/>
           </p:cNvSpPr>
           <p:nvPr>
+            <p:ph type="sldNum" sz="quarter" idx="5"/>
+          </p:nvPr>
+        </p:nvSpPr>
+        <p:spPr/>
+        <p:txBody>
+          <a:bodyPr/>
+          <a:lstStyle/>
+          <a:p>
+            <a:fld id="{AF533E96-F078-4B3D-A8F4-F1AF21EBC357}" type="slidenum">
+              <a:rPr lang="en-US" smtClean="0"/>
+              <a:t>29</a:t>
+            </a:fld>
+            <a:endParaRPr lang="en-US"/>
+          </a:p>
+        </p:txBody>
+      </p:sp>
+    </p:spTree>
+    <p:extLst>
+      <p:ext uri="{BB962C8B-B14F-4D97-AF65-F5344CB8AC3E}">
+        <p14:creationId xmlns:p14="http://schemas.microsoft.com/office/powerpoint/2010/main" val="1128629912"/>
+      </p:ext>
+    </p:extLst>
+  </p:cSld>
+  <p:clrMapOvr>
+    <a:masterClrMapping/>
+  </p:clrMapOvr>
+</p:notes>
+</file>
+
+<file path=ppt/notesSlides/notesSlide21.xml><?xml version="1.0" encoding="utf-8"?>
+<p:notes xmlns:a="http://schemas.openxmlformats.org/drawingml/2006/main" xmlns:r="http://schemas.openxmlformats.org/officeDocument/2006/relationships" xmlns:p="http://schemas.openxmlformats.org/presentationml/2006/main">
+  <p:cSld>
+    <p:spTree>
+      <p:nvGrpSpPr>
+        <p:cNvPr id="1" name=""/>
+        <p:cNvGrpSpPr/>
+        <p:nvPr/>
+      </p:nvGrpSpPr>
+      <p:grpSpPr>
+        <a:xfrm>
+          <a:off x="0" y="0"/>
+          <a:ext cx="0" cy="0"/>
+          <a:chOff x="0" y="0"/>
+          <a:chExt cx="0" cy="0"/>
+        </a:xfrm>
+      </p:grpSpPr>
+      <p:sp>
+        <p:nvSpPr>
+          <p:cNvPr id="2" name="Slide Image Placeholder 1"/>
+          <p:cNvSpPr>
+            <a:spLocks noGrp="1" noRot="1" noChangeAspect="1"/>
+          </p:cNvSpPr>
+          <p:nvPr>
+            <p:ph type="sldImg"/>
+          </p:nvPr>
+        </p:nvSpPr>
+        <p:spPr/>
+      </p:sp>
+      <p:sp>
+        <p:nvSpPr>
+          <p:cNvPr id="3" name="Notes Placeholder 2"/>
+          <p:cNvSpPr>
+            <a:spLocks noGrp="1"/>
+          </p:cNvSpPr>
+          <p:nvPr>
+            <p:ph type="body" idx="1"/>
+          </p:nvPr>
+        </p:nvSpPr>
+        <p:spPr/>
+        <p:txBody>
+          <a:bodyPr/>
+          <a:lstStyle/>
+          <a:p>
+            <a:endParaRPr lang="en-US" dirty="0"/>
+          </a:p>
+        </p:txBody>
+      </p:sp>
+      <p:sp>
+        <p:nvSpPr>
+          <p:cNvPr id="4" name="Slide Number Placeholder 3"/>
+          <p:cNvSpPr>
+            <a:spLocks noGrp="1"/>
+          </p:cNvSpPr>
+          <p:nvPr>
             <p:ph type="sldNum" sz="quarter" idx="10"/>
           </p:nvPr>
         </p:nvSpPr>
@@ -2083,7 +2193,7 @@
           <a:p>
             <a:r>
               <a:rPr lang="en-US" dirty="0"/>
-              <a:t>The best most elegant code in the world will not be a good legacy if it dies a premature death because nobody knows how it works.  </a:t>
+              <a:t>The best most elegant code in the world will not be a good legacy if it dies prematurely because nobody knows how it works.  </a:t>
             </a:r>
           </a:p>
           <a:p>
@@ -2183,7 +2293,23 @@
                   <a:schemeClr val="bg1"/>
                 </a:solidFill>
               </a:rPr>
-              <a:t>At the moment this is about using the class …. Not writing the class definition. (We will cover that later)</a:t>
+              <a:t>At the moment this is about </a:t>
+            </a:r>
+            <a:r>
+              <a:rPr lang="en-US" sz="1200" b="1" dirty="0">
+                <a:solidFill>
+                  <a:schemeClr val="bg1"/>
+                </a:solidFill>
+              </a:rPr>
+              <a:t>using</a:t>
+            </a:r>
+            <a:r>
+              <a:rPr lang="en-US" sz="1200" dirty="0">
+                <a:solidFill>
+                  <a:schemeClr val="bg1"/>
+                </a:solidFill>
+              </a:rPr>
+              <a:t> the class …. Not writing the class definition. (cover writing later)</a:t>
             </a:r>
           </a:p>
           <a:p>
@@ -2256,7 +2382,7 @@
             </a:pPr>
             <a:r>
               <a:rPr lang="en-US" sz="1200" dirty="0"/>
-              <a:t>The header lets our sketch and the compiler know specifically how to use the Led2 class to make a new object plus what properties and methods it has.</a:t>
+              <a:t>It is the header that lets our sketch and the compiler know specifically how to use the Led2 class to make a new object plus what properties and methods it has.</a:t>
             </a:r>
           </a:p>
           <a:p>
@@ -3371,7 +3497,7 @@
                   <a:schemeClr val="tx1"/>
                 </a:solidFill>
               </a:rPr>
-              <a:t>. Is a public method called update. We did a walk through of it in part 1 but I will go through it again on next slide.</a:t>
+              <a:t>. Is a public method called update. We will go through it line by line on the next slide.</a:t>
             </a:r>
           </a:p>
           <a:p>
@@ -3691,7 +3817,7 @@
             <a:fld id="{53074F12-AA26-4AC8-9962-C36BB8F32554}" type="datetimeFigureOut">
               <a:rPr lang="en-US" smtClean="0"/>
               <a:pPr/>
-              <a:t>12/12/2021</a:t>
+              <a:t>12/14/2021</a:t>
             </a:fld>
             <a:endParaRPr lang="en-US"/>
           </a:p>
@@ -3948,7 +4074,7 @@
             <a:fld id="{53074F12-AA26-4AC8-9962-C36BB8F32554}" type="datetimeFigureOut">
               <a:rPr lang="en-US" smtClean="0"/>
               <a:pPr/>
-              <a:t>12/12/2021</a:t>
+              <a:t>12/14/2021</a:t>
             </a:fld>
             <a:endParaRPr lang="en-US"/>
           </a:p>
@@ -4118,7 +4244,7 @@
             <a:fld id="{53074F12-AA26-4AC8-9962-C36BB8F32554}" type="datetimeFigureOut">
               <a:rPr lang="en-US" smtClean="0"/>
               <a:pPr/>
-              <a:t>12/12/2021</a:t>
+              <a:t>12/14/2021</a:t>
             </a:fld>
             <a:endParaRPr lang="en-US"/>
           </a:p>
@@ -4298,7 +4424,7 @@
             <a:fld id="{53074F12-AA26-4AC8-9962-C36BB8F32554}" type="datetimeFigureOut">
               <a:rPr lang="en-US" smtClean="0"/>
               <a:pPr/>
-              <a:t>12/12/2021</a:t>
+              <a:t>12/14/2021</a:t>
             </a:fld>
             <a:endParaRPr lang="en-US"/>
           </a:p>
@@ -6222,7 +6348,7 @@
             <a:fld id="{53074F12-AA26-4AC8-9962-C36BB8F32554}" type="datetimeFigureOut">
               <a:rPr lang="en-US" smtClean="0"/>
               <a:pPr/>
-              <a:t>12/12/2021</a:t>
+              <a:t>12/14/2021</a:t>
             </a:fld>
             <a:endParaRPr lang="en-US"/>
           </a:p>
@@ -7521,7 +7647,7 @@
             <a:fld id="{53074F12-AA26-4AC8-9962-C36BB8F32554}" type="datetimeFigureOut">
               <a:rPr lang="en-US" smtClean="0"/>
               <a:pPr/>
-              <a:t>12/12/2021</a:t>
+              <a:t>12/14/2021</a:t>
             </a:fld>
             <a:endParaRPr lang="en-US"/>
           </a:p>
@@ -7768,7 +7894,7 @@
             <a:fld id="{53074F12-AA26-4AC8-9962-C36BB8F32554}" type="datetimeFigureOut">
               <a:rPr lang="en-US" smtClean="0"/>
               <a:pPr/>
-              <a:t>12/12/2021</a:t>
+              <a:t>12/14/2021</a:t>
             </a:fld>
             <a:endParaRPr lang="en-US"/>
           </a:p>
@@ -8055,7 +8181,7 @@
             <a:fld id="{53074F12-AA26-4AC8-9962-C36BB8F32554}" type="datetimeFigureOut">
               <a:rPr lang="en-US" smtClean="0"/>
               <a:pPr/>
-              <a:t>12/12/2021</a:t>
+              <a:t>12/14/2021</a:t>
             </a:fld>
             <a:endParaRPr lang="en-US"/>
           </a:p>
@@ -8545,7 +8671,7 @@
             <a:fld id="{53074F12-AA26-4AC8-9962-C36BB8F32554}" type="datetimeFigureOut">
               <a:rPr lang="en-US" smtClean="0"/>
               <a:pPr/>
-              <a:t>12/12/2021</a:t>
+              <a:t>12/14/2021</a:t>
             </a:fld>
             <a:endParaRPr lang="en-US"/>
           </a:p>
@@ -8664,7 +8790,7 @@
             <a:fld id="{53074F12-AA26-4AC8-9962-C36BB8F32554}" type="datetimeFigureOut">
               <a:rPr lang="en-US" smtClean="0"/>
               <a:pPr/>
-              <a:t>12/12/2021</a:t>
+              <a:t>12/14/2021</a:t>
             </a:fld>
             <a:endParaRPr lang="en-US"/>
           </a:p>
@@ -8761,7 +8887,7 @@
             <a:fld id="{53074F12-AA26-4AC8-9962-C36BB8F32554}" type="datetimeFigureOut">
               <a:rPr lang="en-US" smtClean="0"/>
               <a:pPr/>
-              <a:t>12/12/2021</a:t>
+              <a:t>12/14/2021</a:t>
             </a:fld>
             <a:endParaRPr lang="en-US"/>
           </a:p>
@@ -9038,7 +9164,7 @@
             <a:fld id="{53074F12-AA26-4AC8-9962-C36BB8F32554}" type="datetimeFigureOut">
               <a:rPr lang="en-US" smtClean="0"/>
               <a:pPr/>
-              <a:t>12/12/2021</a:t>
+              <a:t>12/14/2021</a:t>
             </a:fld>
             <a:endParaRPr lang="en-US"/>
           </a:p>
@@ -9260,7 +9386,7 @@
             <a:fld id="{53074F12-AA26-4AC8-9962-C36BB8F32554}" type="datetimeFigureOut">
               <a:rPr lang="en-US" smtClean="0"/>
               <a:pPr/>
-              <a:t>12/12/2021</a:t>
+              <a:t>12/14/2021</a:t>
             </a:fld>
             <a:endParaRPr lang="en-US"/>
           </a:p>
@@ -19262,7 +19388,7 @@
           <p:nvPr/>
         </p:nvPicPr>
         <p:blipFill>
-          <a:blip r:embed="rId2" cstate="print">
+          <a:blip r:embed="rId3" cstate="print">
             <a:extLst>
               <a:ext uri="{28A0092B-C50C-407E-A947-70E740481C1C}">
                 <a14:useLocalDpi xmlns:a14="http://schemas.microsoft.com/office/drawing/2010/main" val="0"/>
@@ -19390,21 +19516,39 @@
                 <a:latin typeface="Courier New" panose="02070309020205020404" pitchFamily="49" charset="0"/>
                 <a:cs typeface="Courier New" panose="02070309020205020404" pitchFamily="49" charset="0"/>
               </a:rPr>
-              <a:t>  // Save the passed pin and timing values into the </a:t>
+              <a:t>  // Save the passed pin and timing values into the equivalent local variables (with underscore)</a:t>
+            </a:r>
+          </a:p>
+          <a:p>
+            <a:r>
+              <a:rPr lang="en-US" sz="700" dirty="0">
+                <a:latin typeface="Courier New" panose="02070309020205020404" pitchFamily="49" charset="0"/>
+                <a:cs typeface="Courier New" panose="02070309020205020404" pitchFamily="49" charset="0"/>
+              </a:rPr>
+              <a:t>  _pin = pin;</a:t>
+            </a:r>
+          </a:p>
+          <a:p>
+            <a:r>
+              <a:rPr lang="en-US" sz="700" dirty="0">
+                <a:latin typeface="Courier New" panose="02070309020205020404" pitchFamily="49" charset="0"/>
+                <a:cs typeface="Courier New" panose="02070309020205020404" pitchFamily="49" charset="0"/>
+              </a:rPr>
+              <a:t>  _</a:t>
             </a:r>
             <a:r>
               <a:rPr lang="en-US" sz="700" dirty="0" err="1">
                 <a:latin typeface="Courier New" panose="02070309020205020404" pitchFamily="49" charset="0"/>
                 <a:cs typeface="Courier New" panose="02070309020205020404" pitchFamily="49" charset="0"/>
               </a:rPr>
-              <a:t>equivelent</a:t>
+              <a:t>onTime</a:t>
             </a:r>
             <a:r>
               <a:rPr lang="en-US" sz="700" dirty="0">
                 <a:latin typeface="Courier New" panose="02070309020205020404" pitchFamily="49" charset="0"/>
                 <a:cs typeface="Courier New" panose="02070309020205020404" pitchFamily="49" charset="0"/>
               </a:rPr>
-              <a:t> local variables (with underscore)</a:t>
+              <a:t> = on;</a:t>
             </a:r>
           </a:p>
           <a:p>
@@ -19413,90 +19557,44 @@
                 <a:latin typeface="Courier New" panose="02070309020205020404" pitchFamily="49" charset="0"/>
                 <a:cs typeface="Courier New" panose="02070309020205020404" pitchFamily="49" charset="0"/>
               </a:rPr>
-              <a:t>  _pin = pin;</a:t>
-            </a:r>
-          </a:p>
-          <a:p>
+              <a:t>  _</a:t>
+            </a:r>
+            <a:r>
+              <a:rPr lang="en-US" sz="700" dirty="0" err="1">
+                <a:latin typeface="Courier New" panose="02070309020205020404" pitchFamily="49" charset="0"/>
+                <a:cs typeface="Courier New" panose="02070309020205020404" pitchFamily="49" charset="0"/>
+              </a:rPr>
+              <a:t>offTime</a:t>
+            </a:r>
             <a:r>
               <a:rPr lang="en-US" sz="700" dirty="0">
                 <a:latin typeface="Courier New" panose="02070309020205020404" pitchFamily="49" charset="0"/>
                 <a:cs typeface="Courier New" panose="02070309020205020404" pitchFamily="49" charset="0"/>
               </a:rPr>
-              <a:t>  _</a:t>
+              <a:t> = off;</a:t>
+            </a:r>
+          </a:p>
+          <a:p>
+            <a:r>
+              <a:rPr lang="en-US" sz="700" dirty="0">
+                <a:latin typeface="Courier New" panose="02070309020205020404" pitchFamily="49" charset="0"/>
+                <a:cs typeface="Courier New" panose="02070309020205020404" pitchFamily="49" charset="0"/>
+              </a:rPr>
+              <a:t>  // </a:t>
             </a:r>
             <a:r>
               <a:rPr lang="en-US" sz="700" dirty="0" err="1">
                 <a:latin typeface="Courier New" panose="02070309020205020404" pitchFamily="49" charset="0"/>
                 <a:cs typeface="Courier New" panose="02070309020205020404" pitchFamily="49" charset="0"/>
               </a:rPr>
-              <a:t>onTime</a:t>
+              <a:t>Initializion</a:t>
             </a:r>
             <a:r>
               <a:rPr lang="en-US" sz="700" dirty="0">
                 <a:latin typeface="Courier New" panose="02070309020205020404" pitchFamily="49" charset="0"/>
                 <a:cs typeface="Courier New" panose="02070309020205020404" pitchFamily="49" charset="0"/>
               </a:rPr>
-              <a:t> = on;</a:t>
-            </a:r>
-          </a:p>
-          <a:p>
-            <a:r>
-              <a:rPr lang="en-US" sz="700" dirty="0">
-                <a:latin typeface="Courier New" panose="02070309020205020404" pitchFamily="49" charset="0"/>
-                <a:cs typeface="Courier New" panose="02070309020205020404" pitchFamily="49" charset="0"/>
-              </a:rPr>
-              <a:t>  _</a:t>
-            </a:r>
-            <a:r>
-              <a:rPr lang="en-US" sz="700" dirty="0" err="1">
-                <a:latin typeface="Courier New" panose="02070309020205020404" pitchFamily="49" charset="0"/>
-                <a:cs typeface="Courier New" panose="02070309020205020404" pitchFamily="49" charset="0"/>
-              </a:rPr>
-              <a:t>offTime</a:t>
-            </a:r>
-            <a:r>
-              <a:rPr lang="en-US" sz="700" dirty="0">
-                <a:latin typeface="Courier New" panose="02070309020205020404" pitchFamily="49" charset="0"/>
-                <a:cs typeface="Courier New" panose="02070309020205020404" pitchFamily="49" charset="0"/>
-              </a:rPr>
-              <a:t> = off;</a:t>
-            </a:r>
-          </a:p>
-          <a:p>
-            <a:r>
-              <a:rPr lang="en-US" sz="700" dirty="0">
-                <a:latin typeface="Courier New" panose="02070309020205020404" pitchFamily="49" charset="0"/>
-                <a:cs typeface="Courier New" panose="02070309020205020404" pitchFamily="49" charset="0"/>
-              </a:rPr>
-              <a:t>  // </a:t>
-            </a:r>
-            <a:r>
-              <a:rPr lang="en-US" sz="700" dirty="0" err="1">
-                <a:latin typeface="Courier New" panose="02070309020205020404" pitchFamily="49" charset="0"/>
-                <a:cs typeface="Courier New" panose="02070309020205020404" pitchFamily="49" charset="0"/>
-              </a:rPr>
-              <a:t>Initializion</a:t>
-            </a:r>
-            <a:r>
-              <a:rPr lang="en-US" sz="700" dirty="0">
-                <a:latin typeface="Courier New" panose="02070309020205020404" pitchFamily="49" charset="0"/>
-                <a:cs typeface="Courier New" panose="02070309020205020404" pitchFamily="49" charset="0"/>
-              </a:rPr>
-              <a:t> code is kept </a:t>
-            </a:r>
-            <a:r>
-              <a:rPr lang="en-US" sz="700" dirty="0" err="1">
-                <a:latin typeface="Courier New" panose="02070309020205020404" pitchFamily="49" charset="0"/>
-                <a:cs typeface="Courier New" panose="02070309020205020404" pitchFamily="49" charset="0"/>
-              </a:rPr>
-              <a:t>seperate</a:t>
-            </a:r>
-            <a:r>
-              <a:rPr lang="en-US" sz="700" dirty="0">
-                <a:latin typeface="Courier New" panose="02070309020205020404" pitchFamily="49" charset="0"/>
-                <a:cs typeface="Courier New" panose="02070309020205020404" pitchFamily="49" charset="0"/>
-              </a:rPr>
-              <a:t> just for clarity.</a:t>
+              <a:t> code is kept separate just for clarity.</a:t>
             </a:r>
           </a:p>
           <a:p>
@@ -27180,7 +27278,7 @@
         <p:spPr>
           <a:xfrm>
             <a:off x="228600" y="1441353"/>
-            <a:ext cx="7016193" cy="923330"/>
+            <a:ext cx="7016193" cy="1200329"/>
           </a:xfrm>
           <a:prstGeom prst="rect">
             <a:avLst/>
@@ -27219,7 +27317,7 @@
             </a:r>
             <a:r>
               <a:rPr lang="en-US" dirty="0"/>
-              <a:t> functions)</a:t>
+              <a:t> functions). I used the analogy to a shoebox, where some things are hidden inside, and some things are visible on the outside.</a:t>
             </a:r>
           </a:p>
         </p:txBody>

</xml_diff>

<commit_message>
Update Introduction to Class Programming Part 2.pptx
Minor revisions based on SR comments
</commit_message>
<xml_diff>
--- a/Introduction to Class Programming Part 2.pptx
+++ b/Introduction to Class Programming Part 2.pptx
@@ -17,9 +17,9 @@
     <p:sldId id="324" r:id="rId8"/>
     <p:sldId id="308" r:id="rId9"/>
     <p:sldId id="333" r:id="rId10"/>
-    <p:sldId id="331" r:id="rId11"/>
-    <p:sldId id="287" r:id="rId12"/>
-    <p:sldId id="337" r:id="rId13"/>
+    <p:sldId id="287" r:id="rId11"/>
+    <p:sldId id="337" r:id="rId12"/>
+    <p:sldId id="331" r:id="rId13"/>
     <p:sldId id="316" r:id="rId14"/>
     <p:sldId id="335" r:id="rId15"/>
     <p:sldId id="332" r:id="rId16"/>
@@ -248,7 +248,7 @@
           <a:p>
             <a:fld id="{C8D18E60-4300-4729-A0D7-6AB984C3922D}" type="datetimeFigureOut">
               <a:rPr lang="en-US" smtClean="0"/>
-              <a:t>1/13/2022</a:t>
+              <a:t>1/14/2022</a:t>
             </a:fld>
             <a:endParaRPr lang="en-US"/>
           </a:p>
@@ -755,6 +755,21 @@
               <a:t>Same picture as before but explains what the files do.</a:t>
             </a:r>
           </a:p>
+          <a:p>
+            <a:endParaRPr lang="en-US" dirty="0"/>
+          </a:p>
+          <a:p>
+            <a:r>
+              <a:rPr lang="en-US" dirty="0"/>
+              <a:t>Header file defines types such as user defined classes ; </a:t>
+            </a:r>
+          </a:p>
+          <a:p>
+            <a:r>
+              <a:rPr lang="en-US" dirty="0"/>
+              <a:t>Also defines function signatures,     i.e. what parameters the function uses (with types) and what type it returns. </a:t>
+            </a:r>
+          </a:p>
         </p:txBody>
       </p:sp>
       <p:sp>
@@ -959,7 +974,7 @@
           <a:p>
             <a:r>
               <a:rPr lang="en-US" dirty="0"/>
-              <a:t>We covered some of this last time but I am building up our class vocabulary.</a:t>
+              <a:t>We covered some of this last time but I am building up and reinforcing the vocabulary.</a:t>
             </a:r>
             <a:endParaRPr lang="en-US" sz="1200" dirty="0">
               <a:solidFill>
@@ -991,7 +1006,61 @@
                   <a:schemeClr val="tx1"/>
                 </a:solidFill>
               </a:rPr>
-              <a:t>Notice the header has no real executable code of its own – only variable and function declarations – often called prototypes..</a:t>
+              <a:t>Notice the header has no real executable code of its own – only variable and function declarations</a:t>
+            </a:r>
+          </a:p>
+          <a:p>
+            <a:pPr marL="0" marR="0" lvl="0" indent="0" algn="l" defTabSz="914400" rtl="0" eaLnBrk="1" fontAlgn="auto" latinLnBrk="0" hangingPunct="1">
+              <a:lnSpc>
+                <a:spcPct val="100000"/>
+              </a:lnSpc>
+              <a:spcBef>
+                <a:spcPts val="0"/>
+              </a:spcBef>
+              <a:spcAft>
+                <a:spcPts val="0"/>
+              </a:spcAft>
+              <a:buClrTx/>
+              <a:buSzTx/>
+              <a:buFontTx/>
+              <a:buNone/>
+              <a:tabLst/>
+              <a:defRPr/>
+            </a:pPr>
+            <a:r>
+              <a:rPr lang="en-US" sz="1200" dirty="0">
+                <a:solidFill>
+                  <a:schemeClr val="tx1"/>
+                </a:solidFill>
+              </a:rPr>
+              <a:t>For the functions the lines in the header file are called prototypes.</a:t>
+            </a:r>
+          </a:p>
+          <a:p>
+            <a:pPr marL="0" marR="0" lvl="0" indent="0" algn="l" defTabSz="914400" rtl="0" eaLnBrk="1" fontAlgn="auto" latinLnBrk="0" hangingPunct="1">
+              <a:lnSpc>
+                <a:spcPct val="100000"/>
+              </a:lnSpc>
+              <a:spcBef>
+                <a:spcPts val="0"/>
+              </a:spcBef>
+              <a:spcAft>
+                <a:spcPts val="0"/>
+              </a:spcAft>
+              <a:buClrTx/>
+              <a:buSzTx/>
+              <a:buFontTx/>
+              <a:buNone/>
+              <a:tabLst/>
+              <a:defRPr/>
+            </a:pPr>
+            <a:r>
+              <a:rPr lang="en-US" sz="1200" dirty="0">
+                <a:solidFill>
+                  <a:schemeClr val="tx1"/>
+                </a:solidFill>
+              </a:rPr>
+              <a:t>Each prototype has a distinct signature.</a:t>
             </a:r>
             <a:endParaRPr lang="en-US" dirty="0">
               <a:solidFill>
@@ -1039,7 +1108,7 @@
             </a:pPr>
             <a:r>
               <a:rPr lang="en-US" dirty="0"/>
-              <a:t>Mention “Type Signature”   which must match perfectly between header file and the </a:t>
+              <a:t>Mention “The Signature”   which must match perfectly between header file and the </a:t>
             </a:r>
             <a:r>
               <a:rPr lang="en-US" dirty="0" err="1"/>
@@ -2621,8 +2690,11 @@
           <a:p>
             <a:r>
               <a:rPr lang="en-US" dirty="0"/>
-              <a:t>Explain pros and cons of #pragma once     (even when copies and pasted it works)   </a:t>
-            </a:r>
+              <a:t>Explain pros and cons of #pragma once     (even when copied and pasted it still works)   </a:t>
+            </a:r>
+          </a:p>
+          <a:p>
+            <a:endParaRPr lang="en-US" dirty="0"/>
           </a:p>
           <a:p>
             <a:r>
@@ -2633,7 +2705,7 @@
           <a:p>
             <a:r>
               <a:rPr lang="en-US" dirty="0"/>
-              <a:t>And the error messages might not point directly back here!</a:t>
+              <a:t>And the error messages that result might not point directly back here!</a:t>
             </a:r>
           </a:p>
         </p:txBody>
@@ -2737,34 +2809,31 @@
             </a:pPr>
             <a:r>
               <a:rPr lang="en-US" dirty="0"/>
-              <a:t>Full Code of Class Program</a:t>
-            </a:r>
-          </a:p>
-          <a:p>
-            <a:pPr marL="0" marR="0" lvl="0" indent="0" algn="l" defTabSz="914400" rtl="0" eaLnBrk="1" fontAlgn="auto" latinLnBrk="0" hangingPunct="1">
-              <a:lnSpc>
-                <a:spcPct val="100000"/>
-              </a:lnSpc>
-              <a:spcBef>
-                <a:spcPts val="0"/>
-              </a:spcBef>
-              <a:spcAft>
-                <a:spcPts val="0"/>
-              </a:spcAft>
-              <a:buClrTx/>
-              <a:buSzTx/>
-              <a:buFontTx/>
-              <a:buNone/>
-              <a:tabLst/>
-              <a:defRPr/>
-            </a:pPr>
+              <a:t>Full Code of Class Program . Talk it through.</a:t>
+            </a:r>
+          </a:p>
+          <a:p>
+            <a:endParaRPr lang="en-US" dirty="0"/>
+          </a:p>
+          <a:p>
             <a:r>
               <a:rPr lang="en-US" dirty="0"/>
-              <a:t>Talk it through.</a:t>
-            </a:r>
-          </a:p>
-          <a:p>
-            <a:endParaRPr lang="en-US" dirty="0"/>
+              <a:t>Separate </a:t>
+            </a:r>
+            <a:r>
+              <a:rPr lang="en-US" dirty="0" err="1"/>
+              <a:t>init</a:t>
+            </a:r>
+            <a:r>
+              <a:rPr lang="en-US" dirty="0"/>
+              <a:t>() code allows calling it twice (or more) without needing to repeat the code. </a:t>
+            </a:r>
+          </a:p>
+          <a:p>
+            <a:r>
+              <a:rPr lang="en-US" dirty="0"/>
+              <a:t>I think in general a good practice is to minimize repetition of code – use standalone functions and call them as needed.</a:t>
+            </a:r>
           </a:p>
         </p:txBody>
       </p:sp>
@@ -3235,7 +3304,7 @@
           <a:p>
             <a:r>
               <a:rPr lang="en-US" dirty="0"/>
-              <a:t>Look into class code – discuss how it is working as out sketch lines flow.</a:t>
+              <a:t>Look into class code – discuss how it is working as our sketch code flows through the lines.</a:t>
             </a:r>
           </a:p>
         </p:txBody>
@@ -4524,24 +4593,6 @@
             </a:r>
           </a:p>
           <a:p>
-            <a:r>
-              <a:rPr lang="en-US" sz="1200" dirty="0">
-                <a:solidFill>
-                  <a:schemeClr val="bg1"/>
-                </a:solidFill>
-              </a:rPr>
-              <a:t>If the header line is missing (or has a typo) the compiler will likely complain that </a:t>
-            </a:r>
-            <a:r>
-              <a:rPr lang="en-US" sz="1200" b="1" dirty="0">
-                <a:solidFill>
-                  <a:schemeClr val="bg1"/>
-                </a:solidFill>
-              </a:rPr>
-              <a:t>your object definition line does not declare a type</a:t>
-            </a:r>
-          </a:p>
-          <a:p>
             <a:endParaRPr lang="en-US" sz="1200" dirty="0">
               <a:solidFill>
                 <a:schemeClr val="bg1"/>
@@ -4630,6 +4681,59 @@
           <a:bodyPr/>
           <a:lstStyle/>
           <a:p>
+            <a:r>
+              <a:rPr lang="en-US" dirty="0"/>
+              <a:t>Last time I sort of assumed this mental model .. And conveyed it as such.</a:t>
+            </a:r>
+          </a:p>
+          <a:p>
+            <a:r>
+              <a:rPr lang="en-US" dirty="0"/>
+              <a:t>This could be because I am comfortable with using multiple files and developing with my library in mind.</a:t>
+            </a:r>
+          </a:p>
+          <a:p>
+            <a:pPr marL="0" marR="0" lvl="0" indent="0" algn="l" defTabSz="914400" rtl="0" eaLnBrk="1" fontAlgn="auto" latinLnBrk="0" hangingPunct="1">
+              <a:lnSpc>
+                <a:spcPct val="100000"/>
+              </a:lnSpc>
+              <a:spcBef>
+                <a:spcPts val="0"/>
+              </a:spcBef>
+              <a:spcAft>
+                <a:spcPts val="0"/>
+              </a:spcAft>
+              <a:buClrTx/>
+              <a:buSzTx/>
+              <a:buFontTx/>
+              <a:buNone/>
+              <a:tabLst/>
+              <a:defRPr/>
+            </a:pPr>
+            <a:r>
+              <a:rPr lang="en-US" dirty="0"/>
+              <a:t>BUT … You could put all of this code in one larger file … next page.</a:t>
+            </a:r>
+          </a:p>
+          <a:p>
+            <a:endParaRPr lang="en-US" dirty="0"/>
+          </a:p>
+          <a:p>
+            <a:r>
+              <a:rPr lang="en-US" dirty="0"/>
+              <a:t>This organization is commonly used for ANY shared code – with or without classes.</a:t>
+            </a:r>
+          </a:p>
+          <a:p>
+            <a:r>
+              <a:rPr lang="en-US" dirty="0"/>
+              <a:t>Header file and implementation file are normally a matched set.</a:t>
+            </a:r>
+          </a:p>
+          <a:p>
+            <a:endParaRPr lang="en-US" dirty="0"/>
+          </a:p>
+          <a:p>
             <a:endParaRPr lang="en-US" dirty="0"/>
           </a:p>
         </p:txBody>
@@ -4660,7 +4764,7 @@
     </p:spTree>
     <p:extLst>
       <p:ext uri="{BB962C8B-B14F-4D97-AF65-F5344CB8AC3E}">
-        <p14:creationId xmlns:p14="http://schemas.microsoft.com/office/powerpoint/2010/main" val="2672558022"/>
+        <p14:creationId xmlns:p14="http://schemas.microsoft.com/office/powerpoint/2010/main" val="1802817634"/>
       </p:ext>
     </p:extLst>
   </p:cSld>
@@ -4716,19 +4820,28 @@
           <a:p>
             <a:r>
               <a:rPr lang="en-US" dirty="0"/>
-              <a:t>This organization is commonly used for ANY shared code – with or without classes.</a:t>
-            </a:r>
+              <a:t>In the all in one approach the same elements are all there .. (Just don’t need the #include lines)</a:t>
+            </a:r>
+          </a:p>
+          <a:p>
+            <a:endParaRPr lang="en-US" dirty="0"/>
           </a:p>
           <a:p>
             <a:r>
               <a:rPr lang="en-US" dirty="0"/>
-              <a:t>Header file and implementation file are normally a matched set.</a:t>
+              <a:t>Instead of #include on the header file we just have those same  lines of code.</a:t>
             </a:r>
           </a:p>
           <a:p>
             <a:r>
               <a:rPr lang="en-US" dirty="0"/>
-              <a:t>Last time I sort of assumed this mental model .. And conveyed it as such.</a:t>
+              <a:t>The functions ‘implementing’ the class are also in the same INO sketch.</a:t>
+            </a:r>
+          </a:p>
+          <a:p>
+            <a:r>
+              <a:rPr lang="en-US" dirty="0"/>
+              <a:t>As we will see it compiles and runs just fine. </a:t>
             </a:r>
           </a:p>
           <a:p>
@@ -4737,8 +4850,38 @@
           <a:p>
             <a:r>
               <a:rPr lang="en-US" dirty="0"/>
-              <a:t>BUT … You could put all of your code in one file … next page.</a:t>
-            </a:r>
+              <a:t>This is an excellent approach as you are writing a new class for the first time. </a:t>
+            </a:r>
+          </a:p>
+          <a:p>
+            <a:r>
+              <a:rPr lang="en-US" dirty="0"/>
+              <a:t>No need to juggle multiple files – no concerns about other users.</a:t>
+            </a:r>
+          </a:p>
+          <a:p>
+            <a:r>
+              <a:rPr lang="en-US" dirty="0"/>
+              <a:t>Once the code is mature then carve it out and make up the separate files. </a:t>
+            </a:r>
+          </a:p>
+          <a:p>
+            <a:endParaRPr lang="en-US" dirty="0"/>
+          </a:p>
+          <a:p>
+            <a:r>
+              <a:rPr lang="en-US" dirty="0"/>
+              <a:t>This is an early test of my setup – second web camera and also sharing the Arduino IDE. </a:t>
+            </a:r>
+          </a:p>
+          <a:p>
+            <a:r>
+              <a:rPr lang="en-US" dirty="0"/>
+              <a:t>Don’t want to go too deep explaining code here – we will cover it in the more traditional style later on.</a:t>
+            </a:r>
+          </a:p>
+          <a:p>
+            <a:endParaRPr lang="en-US" dirty="0"/>
           </a:p>
         </p:txBody>
       </p:sp>
@@ -4768,7 +4911,7 @@
     </p:spTree>
     <p:extLst>
       <p:ext uri="{BB962C8B-B14F-4D97-AF65-F5344CB8AC3E}">
-        <p14:creationId xmlns:p14="http://schemas.microsoft.com/office/powerpoint/2010/main" val="1802817634"/>
+        <p14:creationId xmlns:p14="http://schemas.microsoft.com/office/powerpoint/2010/main" val="1733825586"/>
       </p:ext>
     </p:extLst>
   </p:cSld>
@@ -4824,44 +4967,8 @@
           <a:p>
             <a:r>
               <a:rPr lang="en-US" dirty="0"/>
-              <a:t>The same elements are all there .. Just don’t need the #include lines.</a:t>
-            </a:r>
-          </a:p>
-          <a:p>
-            <a:r>
-              <a:rPr lang="en-US" dirty="0"/>
-              <a:t>Instead of #include on the header file we just have those same  lines of code.</a:t>
-            </a:r>
-          </a:p>
-          <a:p>
-            <a:r>
-              <a:rPr lang="en-US" dirty="0"/>
-              <a:t>The functions ‘implementing’ the class are also in the same INO sketch.</a:t>
-            </a:r>
-          </a:p>
-          <a:p>
-            <a:r>
-              <a:rPr lang="en-US" dirty="0"/>
-              <a:t>As we will see it compiles and runs just fine. </a:t>
-            </a:r>
-          </a:p>
-          <a:p>
-            <a:endParaRPr lang="en-US" dirty="0"/>
-          </a:p>
-          <a:p>
-            <a:r>
-              <a:rPr lang="en-US" dirty="0"/>
-              <a:t>This is an early test of my setup – second web camera and also sharing the Arduino IDE. </a:t>
-            </a:r>
-          </a:p>
-          <a:p>
-            <a:r>
-              <a:rPr lang="en-US" dirty="0"/>
-              <a:t>Don’t want to go too deep explaining code here – we will cover it in the more traditional style later on.</a:t>
-            </a:r>
-          </a:p>
-          <a:p>
-            <a:endParaRPr lang="en-US" dirty="0"/>
+              <a:t>Putting all of the code in one file is convenient for first time development.</a:t>
+            </a:r>
           </a:p>
         </p:txBody>
       </p:sp>
@@ -4891,7 +4998,7 @@
     </p:spTree>
     <p:extLst>
       <p:ext uri="{BB962C8B-B14F-4D97-AF65-F5344CB8AC3E}">
-        <p14:creationId xmlns:p14="http://schemas.microsoft.com/office/powerpoint/2010/main" val="1733825586"/>
+        <p14:creationId xmlns:p14="http://schemas.microsoft.com/office/powerpoint/2010/main" val="2672558022"/>
       </p:ext>
     </p:extLst>
   </p:cSld>
@@ -5121,7 +5228,7 @@
             <a:fld id="{53074F12-AA26-4AC8-9962-C36BB8F32554}" type="datetimeFigureOut">
               <a:rPr lang="en-US" smtClean="0"/>
               <a:pPr/>
-              <a:t>1/13/2022</a:t>
+              <a:t>1/14/2022</a:t>
             </a:fld>
             <a:endParaRPr lang="en-US"/>
           </a:p>
@@ -5378,7 +5485,7 @@
             <a:fld id="{53074F12-AA26-4AC8-9962-C36BB8F32554}" type="datetimeFigureOut">
               <a:rPr lang="en-US" smtClean="0"/>
               <a:pPr/>
-              <a:t>1/13/2022</a:t>
+              <a:t>1/14/2022</a:t>
             </a:fld>
             <a:endParaRPr lang="en-US"/>
           </a:p>
@@ -5548,7 +5655,7 @@
             <a:fld id="{53074F12-AA26-4AC8-9962-C36BB8F32554}" type="datetimeFigureOut">
               <a:rPr lang="en-US" smtClean="0"/>
               <a:pPr/>
-              <a:t>1/13/2022</a:t>
+              <a:t>1/14/2022</a:t>
             </a:fld>
             <a:endParaRPr lang="en-US"/>
           </a:p>
@@ -5728,7 +5835,7 @@
             <a:fld id="{53074F12-AA26-4AC8-9962-C36BB8F32554}" type="datetimeFigureOut">
               <a:rPr lang="en-US" smtClean="0"/>
               <a:pPr/>
-              <a:t>1/13/2022</a:t>
+              <a:t>1/14/2022</a:t>
             </a:fld>
             <a:endParaRPr lang="en-US"/>
           </a:p>
@@ -7652,7 +7759,7 @@
             <a:fld id="{53074F12-AA26-4AC8-9962-C36BB8F32554}" type="datetimeFigureOut">
               <a:rPr lang="en-US" smtClean="0"/>
               <a:pPr/>
-              <a:t>1/13/2022</a:t>
+              <a:t>1/14/2022</a:t>
             </a:fld>
             <a:endParaRPr lang="en-US"/>
           </a:p>
@@ -8951,7 +9058,7 @@
             <a:fld id="{53074F12-AA26-4AC8-9962-C36BB8F32554}" type="datetimeFigureOut">
               <a:rPr lang="en-US" smtClean="0"/>
               <a:pPr/>
-              <a:t>1/13/2022</a:t>
+              <a:t>1/14/2022</a:t>
             </a:fld>
             <a:endParaRPr lang="en-US"/>
           </a:p>
@@ -9198,7 +9305,7 @@
             <a:fld id="{53074F12-AA26-4AC8-9962-C36BB8F32554}" type="datetimeFigureOut">
               <a:rPr lang="en-US" smtClean="0"/>
               <a:pPr/>
-              <a:t>1/13/2022</a:t>
+              <a:t>1/14/2022</a:t>
             </a:fld>
             <a:endParaRPr lang="en-US"/>
           </a:p>
@@ -9485,7 +9592,7 @@
             <a:fld id="{53074F12-AA26-4AC8-9962-C36BB8F32554}" type="datetimeFigureOut">
               <a:rPr lang="en-US" smtClean="0"/>
               <a:pPr/>
-              <a:t>1/13/2022</a:t>
+              <a:t>1/14/2022</a:t>
             </a:fld>
             <a:endParaRPr lang="en-US"/>
           </a:p>
@@ -9975,7 +10082,7 @@
             <a:fld id="{53074F12-AA26-4AC8-9962-C36BB8F32554}" type="datetimeFigureOut">
               <a:rPr lang="en-US" smtClean="0"/>
               <a:pPr/>
-              <a:t>1/13/2022</a:t>
+              <a:t>1/14/2022</a:t>
             </a:fld>
             <a:endParaRPr lang="en-US"/>
           </a:p>
@@ -10094,7 +10201,7 @@
             <a:fld id="{53074F12-AA26-4AC8-9962-C36BB8F32554}" type="datetimeFigureOut">
               <a:rPr lang="en-US" smtClean="0"/>
               <a:pPr/>
-              <a:t>1/13/2022</a:t>
+              <a:t>1/14/2022</a:t>
             </a:fld>
             <a:endParaRPr lang="en-US"/>
           </a:p>
@@ -10191,7 +10298,7 @@
             <a:fld id="{53074F12-AA26-4AC8-9962-C36BB8F32554}" type="datetimeFigureOut">
               <a:rPr lang="en-US" smtClean="0"/>
               <a:pPr/>
-              <a:t>1/13/2022</a:t>
+              <a:t>1/14/2022</a:t>
             </a:fld>
             <a:endParaRPr lang="en-US"/>
           </a:p>
@@ -10468,7 +10575,7 @@
             <a:fld id="{53074F12-AA26-4AC8-9962-C36BB8F32554}" type="datetimeFigureOut">
               <a:rPr lang="en-US" smtClean="0"/>
               <a:pPr/>
-              <a:t>1/13/2022</a:t>
+              <a:t>1/14/2022</a:t>
             </a:fld>
             <a:endParaRPr lang="en-US"/>
           </a:p>
@@ -10690,7 +10797,7 @@
             <a:fld id="{53074F12-AA26-4AC8-9962-C36BB8F32554}" type="datetimeFigureOut">
               <a:rPr lang="en-US" smtClean="0"/>
               <a:pPr/>
-              <a:t>1/13/2022</a:t>
+              <a:t>1/14/2022</a:t>
             </a:fld>
             <a:endParaRPr lang="en-US"/>
           </a:p>
@@ -12424,784 +12531,6 @@
           <a:p>
             <a:r>
               <a:rPr lang="en-US" dirty="0"/>
-              <a:t>Typical File Arrangement</a:t>
-            </a:r>
-          </a:p>
-        </p:txBody>
-      </p:sp>
-      <p:pic>
-        <p:nvPicPr>
-          <p:cNvPr id="26" name="Picture 25">
-            <a:extLst>
-              <a:ext uri="{FF2B5EF4-FFF2-40B4-BE49-F238E27FC236}">
-                <a16:creationId xmlns:a16="http://schemas.microsoft.com/office/drawing/2014/main" id="{C2E5F3F1-C711-44AB-9F70-E67D2E44F1AC}"/>
-              </a:ext>
-            </a:extLst>
-          </p:cNvPr>
-          <p:cNvPicPr>
-            <a:picLocks noChangeAspect="1"/>
-          </p:cNvPicPr>
-          <p:nvPr/>
-        </p:nvPicPr>
-        <p:blipFill>
-          <a:blip r:embed="rId3" cstate="print">
-            <a:extLst>
-              <a:ext uri="{28A0092B-C50C-407E-A947-70E740481C1C}">
-                <a14:useLocalDpi xmlns:a14="http://schemas.microsoft.com/office/drawing/2010/main" val="0"/>
-              </a:ext>
-            </a:extLst>
-          </a:blip>
-          <a:stretch>
-            <a:fillRect/>
-          </a:stretch>
-        </p:blipFill>
-        <p:spPr>
-          <a:xfrm>
-            <a:off x="7848600" y="4583336"/>
-            <a:ext cx="1028700" cy="457771"/>
-          </a:xfrm>
-          <a:prstGeom prst="rect">
-            <a:avLst/>
-          </a:prstGeom>
-        </p:spPr>
-      </p:pic>
-      <p:sp>
-        <p:nvSpPr>
-          <p:cNvPr id="2" name="Rectangle 1">
-            <a:extLst>
-              <a:ext uri="{FF2B5EF4-FFF2-40B4-BE49-F238E27FC236}">
-                <a16:creationId xmlns:a16="http://schemas.microsoft.com/office/drawing/2014/main" id="{E4033C97-9E42-438B-9F64-FCDB315673E9}"/>
-              </a:ext>
-            </a:extLst>
-          </p:cNvPr>
-          <p:cNvSpPr/>
-          <p:nvPr/>
-        </p:nvSpPr>
-        <p:spPr>
-          <a:xfrm>
-            <a:off x="1143000" y="1962150"/>
-            <a:ext cx="2057400" cy="1219200"/>
-          </a:xfrm>
-          <a:prstGeom prst="rect">
-            <a:avLst/>
-          </a:prstGeom>
-        </p:spPr>
-        <p:style>
-          <a:lnRef idx="2">
-            <a:schemeClr val="accent1">
-              <a:shade val="50000"/>
-            </a:schemeClr>
-          </a:lnRef>
-          <a:fillRef idx="1">
-            <a:schemeClr val="accent1"/>
-          </a:fillRef>
-          <a:effectRef idx="0">
-            <a:schemeClr val="accent1"/>
-          </a:effectRef>
-          <a:fontRef idx="minor">
-            <a:schemeClr val="lt1"/>
-          </a:fontRef>
-        </p:style>
-        <p:txBody>
-          <a:bodyPr rtlCol="0" anchor="ctr"/>
-          <a:lstStyle/>
-          <a:p>
-            <a:pPr algn="ctr"/>
-            <a:r>
-              <a:rPr lang="en-US" dirty="0"/>
-              <a:t>Sketch</a:t>
-            </a:r>
-          </a:p>
-        </p:txBody>
-      </p:sp>
-      <p:sp>
-        <p:nvSpPr>
-          <p:cNvPr id="10" name="Rectangle 9">
-            <a:extLst>
-              <a:ext uri="{FF2B5EF4-FFF2-40B4-BE49-F238E27FC236}">
-                <a16:creationId xmlns:a16="http://schemas.microsoft.com/office/drawing/2014/main" id="{DFADDBC3-7317-4D05-BBCE-5B79A27A9295}"/>
-              </a:ext>
-            </a:extLst>
-          </p:cNvPr>
-          <p:cNvSpPr/>
-          <p:nvPr/>
-        </p:nvSpPr>
-        <p:spPr>
-          <a:xfrm>
-            <a:off x="4191000" y="1657350"/>
-            <a:ext cx="2057400" cy="907052"/>
-          </a:xfrm>
-          <a:prstGeom prst="rect">
-            <a:avLst/>
-          </a:prstGeom>
-          <a:solidFill>
-            <a:schemeClr val="accent2">
-              <a:lumMod val="20000"/>
-              <a:lumOff val="80000"/>
-            </a:schemeClr>
-          </a:solidFill>
-        </p:spPr>
-        <p:style>
-          <a:lnRef idx="2">
-            <a:schemeClr val="accent1">
-              <a:shade val="50000"/>
-            </a:schemeClr>
-          </a:lnRef>
-          <a:fillRef idx="1">
-            <a:schemeClr val="accent1"/>
-          </a:fillRef>
-          <a:effectRef idx="0">
-            <a:schemeClr val="accent1"/>
-          </a:effectRef>
-          <a:fontRef idx="minor">
-            <a:schemeClr val="lt1"/>
-          </a:fontRef>
-        </p:style>
-        <p:txBody>
-          <a:bodyPr rtlCol="0" anchor="ctr"/>
-          <a:lstStyle/>
-          <a:p>
-            <a:pPr algn="ctr"/>
-            <a:r>
-              <a:rPr lang="en-US" dirty="0"/>
-              <a:t>Header File</a:t>
-            </a:r>
-          </a:p>
-        </p:txBody>
-      </p:sp>
-      <p:sp>
-        <p:nvSpPr>
-          <p:cNvPr id="11" name="Rectangle 10">
-            <a:extLst>
-              <a:ext uri="{FF2B5EF4-FFF2-40B4-BE49-F238E27FC236}">
-                <a16:creationId xmlns:a16="http://schemas.microsoft.com/office/drawing/2014/main" id="{D9965A67-64E0-4178-82EC-A604ADD32FE2}"/>
-              </a:ext>
-            </a:extLst>
-          </p:cNvPr>
-          <p:cNvSpPr/>
-          <p:nvPr/>
-        </p:nvSpPr>
-        <p:spPr>
-          <a:xfrm>
-            <a:off x="4191000" y="2610123"/>
-            <a:ext cx="2057400" cy="1219200"/>
-          </a:xfrm>
-          <a:prstGeom prst="rect">
-            <a:avLst/>
-          </a:prstGeom>
-          <a:solidFill>
-            <a:schemeClr val="accent2">
-              <a:lumMod val="40000"/>
-              <a:lumOff val="60000"/>
-            </a:schemeClr>
-          </a:solidFill>
-        </p:spPr>
-        <p:style>
-          <a:lnRef idx="2">
-            <a:schemeClr val="accent1">
-              <a:shade val="50000"/>
-            </a:schemeClr>
-          </a:lnRef>
-          <a:fillRef idx="1">
-            <a:schemeClr val="accent1"/>
-          </a:fillRef>
-          <a:effectRef idx="0">
-            <a:schemeClr val="accent1"/>
-          </a:effectRef>
-          <a:fontRef idx="minor">
-            <a:schemeClr val="lt1"/>
-          </a:fontRef>
-        </p:style>
-        <p:txBody>
-          <a:bodyPr rtlCol="0" anchor="ctr"/>
-          <a:lstStyle/>
-          <a:p>
-            <a:pPr algn="ctr"/>
-            <a:r>
-              <a:rPr lang="en-US" dirty="0"/>
-              <a:t>CPP File</a:t>
-            </a:r>
-          </a:p>
-        </p:txBody>
-      </p:sp>
-      <p:sp>
-        <p:nvSpPr>
-          <p:cNvPr id="7" name="Rectangle 6">
-            <a:extLst>
-              <a:ext uri="{FF2B5EF4-FFF2-40B4-BE49-F238E27FC236}">
-                <a16:creationId xmlns:a16="http://schemas.microsoft.com/office/drawing/2014/main" id="{861D812D-1B8E-4382-B877-29F161D7FBEA}"/>
-              </a:ext>
-            </a:extLst>
-          </p:cNvPr>
-          <p:cNvSpPr/>
-          <p:nvPr/>
-        </p:nvSpPr>
-        <p:spPr>
-          <a:xfrm>
-            <a:off x="1219200" y="1986643"/>
-            <a:ext cx="1524000" cy="304800"/>
-          </a:xfrm>
-          <a:prstGeom prst="rect">
-            <a:avLst/>
-          </a:prstGeom>
-          <a:solidFill>
-            <a:schemeClr val="accent2">
-              <a:lumMod val="20000"/>
-              <a:lumOff val="80000"/>
-            </a:schemeClr>
-          </a:solidFill>
-        </p:spPr>
-        <p:style>
-          <a:lnRef idx="2">
-            <a:schemeClr val="accent1">
-              <a:shade val="50000"/>
-            </a:schemeClr>
-          </a:lnRef>
-          <a:fillRef idx="1">
-            <a:schemeClr val="accent1"/>
-          </a:fillRef>
-          <a:effectRef idx="0">
-            <a:schemeClr val="accent1"/>
-          </a:effectRef>
-          <a:fontRef idx="minor">
-            <a:schemeClr val="lt1"/>
-          </a:fontRef>
-        </p:style>
-        <p:txBody>
-          <a:bodyPr rtlCol="0" anchor="ctr"/>
-          <a:lstStyle/>
-          <a:p>
-            <a:r>
-              <a:rPr lang="en-US" sz="1200" dirty="0">
-                <a:solidFill>
-                  <a:srgbClr val="FF0000"/>
-                </a:solidFill>
-              </a:rPr>
-              <a:t>#include header File</a:t>
-            </a:r>
-          </a:p>
-        </p:txBody>
-      </p:sp>
-      <p:sp>
-        <p:nvSpPr>
-          <p:cNvPr id="8" name="Rectangle 7">
-            <a:extLst>
-              <a:ext uri="{FF2B5EF4-FFF2-40B4-BE49-F238E27FC236}">
-                <a16:creationId xmlns:a16="http://schemas.microsoft.com/office/drawing/2014/main" id="{C10D932C-861E-4942-B493-7E5267E103D8}"/>
-              </a:ext>
-            </a:extLst>
-          </p:cNvPr>
-          <p:cNvSpPr/>
-          <p:nvPr/>
-        </p:nvSpPr>
-        <p:spPr>
-          <a:xfrm>
-            <a:off x="4267200" y="2647950"/>
-            <a:ext cx="1524000" cy="304800"/>
-          </a:xfrm>
-          <a:prstGeom prst="rect">
-            <a:avLst/>
-          </a:prstGeom>
-          <a:solidFill>
-            <a:schemeClr val="accent2">
-              <a:lumMod val="20000"/>
-              <a:lumOff val="80000"/>
-            </a:schemeClr>
-          </a:solidFill>
-        </p:spPr>
-        <p:style>
-          <a:lnRef idx="2">
-            <a:schemeClr val="accent1">
-              <a:shade val="50000"/>
-            </a:schemeClr>
-          </a:lnRef>
-          <a:fillRef idx="1">
-            <a:schemeClr val="accent1"/>
-          </a:fillRef>
-          <a:effectRef idx="0">
-            <a:schemeClr val="accent1"/>
-          </a:effectRef>
-          <a:fontRef idx="minor">
-            <a:schemeClr val="lt1"/>
-          </a:fontRef>
-        </p:style>
-        <p:txBody>
-          <a:bodyPr rtlCol="0" anchor="ctr"/>
-          <a:lstStyle/>
-          <a:p>
-            <a:r>
-              <a:rPr lang="en-US" sz="1200" dirty="0">
-                <a:solidFill>
-                  <a:srgbClr val="FF0000"/>
-                </a:solidFill>
-              </a:rPr>
-              <a:t>#include header File</a:t>
-            </a:r>
-          </a:p>
-        </p:txBody>
-      </p:sp>
-      <p:grpSp>
-        <p:nvGrpSpPr>
-          <p:cNvPr id="6" name="Group 5">
-            <a:extLst>
-              <a:ext uri="{FF2B5EF4-FFF2-40B4-BE49-F238E27FC236}">
-                <a16:creationId xmlns:a16="http://schemas.microsoft.com/office/drawing/2014/main" id="{A5D2415B-3FD2-498A-89BF-B907DAA51A24}"/>
-              </a:ext>
-            </a:extLst>
-          </p:cNvPr>
-          <p:cNvGrpSpPr/>
-          <p:nvPr/>
-        </p:nvGrpSpPr>
-        <p:grpSpPr>
-          <a:xfrm>
-            <a:off x="6021977" y="1504950"/>
-            <a:ext cx="1598023" cy="2748099"/>
-            <a:chOff x="6021977" y="1662249"/>
-            <a:chExt cx="1598023" cy="2590800"/>
-          </a:xfrm>
-        </p:grpSpPr>
-        <p:sp>
-          <p:nvSpPr>
-            <p:cNvPr id="3" name="Right Brace 2">
-              <a:extLst>
-                <a:ext uri="{FF2B5EF4-FFF2-40B4-BE49-F238E27FC236}">
-                  <a16:creationId xmlns:a16="http://schemas.microsoft.com/office/drawing/2014/main" id="{6E974F93-E3AC-47BE-A533-F235405E1CE6}"/>
-                </a:ext>
-              </a:extLst>
-            </p:cNvPr>
-            <p:cNvSpPr/>
-            <p:nvPr/>
-          </p:nvSpPr>
-          <p:spPr>
-            <a:xfrm>
-              <a:off x="6021977" y="1662249"/>
-              <a:ext cx="685800" cy="2590800"/>
-            </a:xfrm>
-            <a:prstGeom prst="rightBrace">
-              <a:avLst/>
-            </a:prstGeom>
-            <a:ln w="38100">
-              <a:solidFill>
-                <a:srgbClr val="FF0000"/>
-              </a:solidFill>
-            </a:ln>
-          </p:spPr>
-          <p:style>
-            <a:lnRef idx="1">
-              <a:schemeClr val="accent1"/>
-            </a:lnRef>
-            <a:fillRef idx="0">
-              <a:schemeClr val="accent1"/>
-            </a:fillRef>
-            <a:effectRef idx="0">
-              <a:schemeClr val="accent1"/>
-            </a:effectRef>
-            <a:fontRef idx="minor">
-              <a:schemeClr val="tx1"/>
-            </a:fontRef>
-          </p:style>
-          <p:txBody>
-            <a:bodyPr rtlCol="0" anchor="ctr"/>
-            <a:lstStyle/>
-            <a:p>
-              <a:pPr algn="ctr"/>
-              <a:endParaRPr lang="en-US">
-                <a:solidFill>
-                  <a:srgbClr val="FF0000"/>
-                </a:solidFill>
-              </a:endParaRPr>
-            </a:p>
-          </p:txBody>
-        </p:sp>
-        <p:sp>
-          <p:nvSpPr>
-            <p:cNvPr id="5" name="TextBox 4">
-              <a:extLst>
-                <a:ext uri="{FF2B5EF4-FFF2-40B4-BE49-F238E27FC236}">
-                  <a16:creationId xmlns:a16="http://schemas.microsoft.com/office/drawing/2014/main" id="{3B4ECFF8-6B43-49D7-86CF-6A7B0986037B}"/>
-                </a:ext>
-              </a:extLst>
-            </p:cNvPr>
-            <p:cNvSpPr txBox="1"/>
-            <p:nvPr/>
-          </p:nvSpPr>
-          <p:spPr>
-            <a:xfrm>
-              <a:off x="6479177" y="2607129"/>
-              <a:ext cx="1140823" cy="646331"/>
-            </a:xfrm>
-            <a:prstGeom prst="rect">
-              <a:avLst/>
-            </a:prstGeom>
-            <a:noFill/>
-          </p:spPr>
-          <p:txBody>
-            <a:bodyPr wrap="square" rtlCol="0">
-              <a:spAutoFit/>
-            </a:bodyPr>
-            <a:lstStyle/>
-            <a:p>
-              <a:r>
-                <a:rPr lang="en-US" dirty="0">
-                  <a:solidFill>
-                    <a:srgbClr val="FF0000"/>
-                  </a:solidFill>
-                </a:rPr>
-                <a:t>Matched</a:t>
-              </a:r>
-            </a:p>
-            <a:p>
-              <a:r>
-                <a:rPr lang="en-US" dirty="0">
-                  <a:solidFill>
-                    <a:srgbClr val="FF0000"/>
-                  </a:solidFill>
-                </a:rPr>
-                <a:t>Set</a:t>
-              </a:r>
-            </a:p>
-          </p:txBody>
-        </p:sp>
-      </p:grpSp>
-    </p:spTree>
-    <p:extLst>
-      <p:ext uri="{BB962C8B-B14F-4D97-AF65-F5344CB8AC3E}">
-        <p14:creationId xmlns:p14="http://schemas.microsoft.com/office/powerpoint/2010/main" val="2612453022"/>
-      </p:ext>
-    </p:extLst>
-  </p:cSld>
-  <p:clrMapOvr>
-    <a:masterClrMapping/>
-  </p:clrMapOvr>
-  <p:timing>
-    <p:tnLst>
-      <p:par>
-        <p:cTn id="1" dur="indefinite" restart="never" nodeType="tmRoot">
-          <p:childTnLst>
-            <p:seq concurrent="1" nextAc="seek">
-              <p:cTn id="2" dur="indefinite" nodeType="mainSeq">
-                <p:childTnLst>
-                  <p:par>
-                    <p:cTn id="3" fill="hold">
-                      <p:stCondLst>
-                        <p:cond delay="indefinite"/>
-                      </p:stCondLst>
-                      <p:childTnLst>
-                        <p:par>
-                          <p:cTn id="4" fill="hold">
-                            <p:stCondLst>
-                              <p:cond delay="0"/>
-                            </p:stCondLst>
-                            <p:childTnLst>
-                              <p:par>
-                                <p:cTn id="5" presetID="10" presetClass="entr" presetSubtype="0" fill="hold" nodeType="clickEffect">
-                                  <p:stCondLst>
-                                    <p:cond delay="0"/>
-                                  </p:stCondLst>
-                                  <p:childTnLst>
-                                    <p:set>
-                                      <p:cBhvr>
-                                        <p:cTn id="6" dur="1" fill="hold">
-                                          <p:stCondLst>
-                                            <p:cond delay="0"/>
-                                          </p:stCondLst>
-                                        </p:cTn>
-                                        <p:tgtEl>
-                                          <p:spTgt spid="6"/>
-                                        </p:tgtEl>
-                                        <p:attrNameLst>
-                                          <p:attrName>style.visibility</p:attrName>
-                                        </p:attrNameLst>
-                                      </p:cBhvr>
-                                      <p:to>
-                                        <p:strVal val="visible"/>
-                                      </p:to>
-                                    </p:set>
-                                    <p:animEffect transition="in" filter="fade">
-                                      <p:cBhvr>
-                                        <p:cTn id="7" dur="500"/>
-                                        <p:tgtEl>
-                                          <p:spTgt spid="6"/>
-                                        </p:tgtEl>
-                                      </p:cBhvr>
-                                    </p:animEffect>
-                                  </p:childTnLst>
-                                </p:cTn>
-                              </p:par>
-                            </p:childTnLst>
-                          </p:cTn>
-                        </p:par>
-                      </p:childTnLst>
-                    </p:cTn>
-                  </p:par>
-                  <p:par>
-                    <p:cTn id="8" fill="hold">
-                      <p:stCondLst>
-                        <p:cond delay="indefinite"/>
-                      </p:stCondLst>
-                      <p:childTnLst>
-                        <p:par>
-                          <p:cTn id="9" fill="hold">
-                            <p:stCondLst>
-                              <p:cond delay="0"/>
-                            </p:stCondLst>
-                            <p:childTnLst>
-                              <p:par>
-                                <p:cTn id="10" presetID="42" presetClass="entr" presetSubtype="0" fill="hold" grpId="0" nodeType="clickEffect">
-                                  <p:stCondLst>
-                                    <p:cond delay="0"/>
-                                  </p:stCondLst>
-                                  <p:childTnLst>
-                                    <p:set>
-                                      <p:cBhvr>
-                                        <p:cTn id="11" dur="1" fill="hold">
-                                          <p:stCondLst>
-                                            <p:cond delay="0"/>
-                                          </p:stCondLst>
-                                        </p:cTn>
-                                        <p:tgtEl>
-                                          <p:spTgt spid="7"/>
-                                        </p:tgtEl>
-                                        <p:attrNameLst>
-                                          <p:attrName>style.visibility</p:attrName>
-                                        </p:attrNameLst>
-                                      </p:cBhvr>
-                                      <p:to>
-                                        <p:strVal val="visible"/>
-                                      </p:to>
-                                    </p:set>
-                                    <p:animEffect transition="in" filter="fade">
-                                      <p:cBhvr>
-                                        <p:cTn id="12" dur="1000"/>
-                                        <p:tgtEl>
-                                          <p:spTgt spid="7"/>
-                                        </p:tgtEl>
-                                      </p:cBhvr>
-                                    </p:animEffect>
-                                    <p:anim calcmode="lin" valueType="num">
-                                      <p:cBhvr>
-                                        <p:cTn id="13" dur="1000" fill="hold"/>
-                                        <p:tgtEl>
-                                          <p:spTgt spid="7"/>
-                                        </p:tgtEl>
-                                        <p:attrNameLst>
-                                          <p:attrName>ppt_x</p:attrName>
-                                        </p:attrNameLst>
-                                      </p:cBhvr>
-                                      <p:tavLst>
-                                        <p:tav tm="0">
-                                          <p:val>
-                                            <p:strVal val="#ppt_x"/>
-                                          </p:val>
-                                        </p:tav>
-                                        <p:tav tm="100000">
-                                          <p:val>
-                                            <p:strVal val="#ppt_x"/>
-                                          </p:val>
-                                        </p:tav>
-                                      </p:tavLst>
-                                    </p:anim>
-                                    <p:anim calcmode="lin" valueType="num">
-                                      <p:cBhvr>
-                                        <p:cTn id="14" dur="1000" fill="hold"/>
-                                        <p:tgtEl>
-                                          <p:spTgt spid="7"/>
-                                        </p:tgtEl>
-                                        <p:attrNameLst>
-                                          <p:attrName>ppt_y</p:attrName>
-                                        </p:attrNameLst>
-                                      </p:cBhvr>
-                                      <p:tavLst>
-                                        <p:tav tm="0">
-                                          <p:val>
-                                            <p:strVal val="#ppt_y+.1"/>
-                                          </p:val>
-                                        </p:tav>
-                                        <p:tav tm="100000">
-                                          <p:val>
-                                            <p:strVal val="#ppt_y"/>
-                                          </p:val>
-                                        </p:tav>
-                                      </p:tavLst>
-                                    </p:anim>
-                                  </p:childTnLst>
-                                </p:cTn>
-                              </p:par>
-                            </p:childTnLst>
-                          </p:cTn>
-                        </p:par>
-                      </p:childTnLst>
-                    </p:cTn>
-                  </p:par>
-                  <p:par>
-                    <p:cTn id="15" fill="hold">
-                      <p:stCondLst>
-                        <p:cond delay="indefinite"/>
-                      </p:stCondLst>
-                      <p:childTnLst>
-                        <p:par>
-                          <p:cTn id="16" fill="hold">
-                            <p:stCondLst>
-                              <p:cond delay="0"/>
-                            </p:stCondLst>
-                            <p:childTnLst>
-                              <p:par>
-                                <p:cTn id="17" presetID="42" presetClass="entr" presetSubtype="0" fill="hold" grpId="0" nodeType="clickEffect">
-                                  <p:stCondLst>
-                                    <p:cond delay="0"/>
-                                  </p:stCondLst>
-                                  <p:childTnLst>
-                                    <p:set>
-                                      <p:cBhvr>
-                                        <p:cTn id="18" dur="1" fill="hold">
-                                          <p:stCondLst>
-                                            <p:cond delay="0"/>
-                                          </p:stCondLst>
-                                        </p:cTn>
-                                        <p:tgtEl>
-                                          <p:spTgt spid="8"/>
-                                        </p:tgtEl>
-                                        <p:attrNameLst>
-                                          <p:attrName>style.visibility</p:attrName>
-                                        </p:attrNameLst>
-                                      </p:cBhvr>
-                                      <p:to>
-                                        <p:strVal val="visible"/>
-                                      </p:to>
-                                    </p:set>
-                                    <p:animEffect transition="in" filter="fade">
-                                      <p:cBhvr>
-                                        <p:cTn id="19" dur="1000"/>
-                                        <p:tgtEl>
-                                          <p:spTgt spid="8"/>
-                                        </p:tgtEl>
-                                      </p:cBhvr>
-                                    </p:animEffect>
-                                    <p:anim calcmode="lin" valueType="num">
-                                      <p:cBhvr>
-                                        <p:cTn id="20" dur="1000" fill="hold"/>
-                                        <p:tgtEl>
-                                          <p:spTgt spid="8"/>
-                                        </p:tgtEl>
-                                        <p:attrNameLst>
-                                          <p:attrName>ppt_x</p:attrName>
-                                        </p:attrNameLst>
-                                      </p:cBhvr>
-                                      <p:tavLst>
-                                        <p:tav tm="0">
-                                          <p:val>
-                                            <p:strVal val="#ppt_x"/>
-                                          </p:val>
-                                        </p:tav>
-                                        <p:tav tm="100000">
-                                          <p:val>
-                                            <p:strVal val="#ppt_x"/>
-                                          </p:val>
-                                        </p:tav>
-                                      </p:tavLst>
-                                    </p:anim>
-                                    <p:anim calcmode="lin" valueType="num">
-                                      <p:cBhvr>
-                                        <p:cTn id="21" dur="1000" fill="hold"/>
-                                        <p:tgtEl>
-                                          <p:spTgt spid="8"/>
-                                        </p:tgtEl>
-                                        <p:attrNameLst>
-                                          <p:attrName>ppt_y</p:attrName>
-                                        </p:attrNameLst>
-                                      </p:cBhvr>
-                                      <p:tavLst>
-                                        <p:tav tm="0">
-                                          <p:val>
-                                            <p:strVal val="#ppt_y+.1"/>
-                                          </p:val>
-                                        </p:tav>
-                                        <p:tav tm="100000">
-                                          <p:val>
-                                            <p:strVal val="#ppt_y"/>
-                                          </p:val>
-                                        </p:tav>
-                                      </p:tavLst>
-                                    </p:anim>
-                                  </p:childTnLst>
-                                </p:cTn>
-                              </p:par>
-                            </p:childTnLst>
-                          </p:cTn>
-                        </p:par>
-                      </p:childTnLst>
-                    </p:cTn>
-                  </p:par>
-                </p:childTnLst>
-              </p:cTn>
-              <p:prevCondLst>
-                <p:cond evt="onPrev" delay="0">
-                  <p:tgtEl>
-                    <p:sldTgt/>
-                  </p:tgtEl>
-                </p:cond>
-              </p:prevCondLst>
-              <p:nextCondLst>
-                <p:cond evt="onNext" delay="0">
-                  <p:tgtEl>
-                    <p:sldTgt/>
-                  </p:tgtEl>
-                </p:cond>
-              </p:nextCondLst>
-            </p:seq>
-          </p:childTnLst>
-        </p:cTn>
-      </p:par>
-    </p:tnLst>
-    <p:bldLst>
-      <p:bldP spid="7" grpId="0" animBg="1"/>
-      <p:bldP spid="8" grpId="0" animBg="1"/>
-    </p:bldLst>
-  </p:timing>
-</p:sld>
-</file>
-
-<file path=ppt/slides/slide11.xml><?xml version="1.0" encoding="utf-8"?>
-<p:sld xmlns:a="http://schemas.openxmlformats.org/drawingml/2006/main" xmlns:r="http://schemas.openxmlformats.org/officeDocument/2006/relationships" xmlns:p="http://schemas.openxmlformats.org/presentationml/2006/main">
-  <p:cSld>
-    <p:spTree>
-      <p:nvGrpSpPr>
-        <p:cNvPr id="1" name=""/>
-        <p:cNvGrpSpPr/>
-        <p:nvPr/>
-      </p:nvGrpSpPr>
-      <p:grpSpPr>
-        <a:xfrm>
-          <a:off x="0" y="0"/>
-          <a:ext cx="0" cy="0"/>
-          <a:chOff x="0" y="0"/>
-          <a:chExt cx="0" cy="0"/>
-        </a:xfrm>
-      </p:grpSpPr>
-      <p:sp>
-        <p:nvSpPr>
-          <p:cNvPr id="4" name="Title 3"/>
-          <p:cNvSpPr>
-            <a:spLocks noGrp="1"/>
-          </p:cNvSpPr>
-          <p:nvPr>
-            <p:ph type="title"/>
-          </p:nvPr>
-        </p:nvSpPr>
-        <p:spPr>
-          <a:xfrm>
-            <a:off x="457200" y="376238"/>
-            <a:ext cx="7016194" cy="602252"/>
-          </a:xfrm>
-        </p:spPr>
-        <p:txBody>
-          <a:bodyPr>
-            <a:normAutofit fontScale="90000"/>
-          </a:bodyPr>
-          <a:lstStyle/>
-          <a:p>
-            <a:r>
-              <a:rPr lang="en-US" dirty="0"/>
               <a:t>All in one View</a:t>
             </a:r>
           </a:p>
@@ -13590,6 +12919,555 @@
 </p:sld>
 </file>
 
+<file path=ppt/slides/slide11.xml><?xml version="1.0" encoding="utf-8"?>
+<p:sld xmlns:a="http://schemas.openxmlformats.org/drawingml/2006/main" xmlns:r="http://schemas.openxmlformats.org/officeDocument/2006/relationships" xmlns:p="http://schemas.openxmlformats.org/presentationml/2006/main">
+  <p:cSld>
+    <p:spTree>
+      <p:nvGrpSpPr>
+        <p:cNvPr id="1" name=""/>
+        <p:cNvGrpSpPr/>
+        <p:nvPr/>
+      </p:nvGrpSpPr>
+      <p:grpSpPr>
+        <a:xfrm>
+          <a:off x="0" y="0"/>
+          <a:ext cx="0" cy="0"/>
+          <a:chOff x="0" y="0"/>
+          <a:chExt cx="0" cy="0"/>
+        </a:xfrm>
+      </p:grpSpPr>
+      <p:sp>
+        <p:nvSpPr>
+          <p:cNvPr id="2" name="Title 1">
+            <a:extLst>
+              <a:ext uri="{FF2B5EF4-FFF2-40B4-BE49-F238E27FC236}">
+                <a16:creationId xmlns:a16="http://schemas.microsoft.com/office/drawing/2014/main" id="{AA0F3F4A-B72A-4896-8807-D94D8A7E019C}"/>
+              </a:ext>
+            </a:extLst>
+          </p:cNvPr>
+          <p:cNvSpPr>
+            <a:spLocks noGrp="1"/>
+          </p:cNvSpPr>
+          <p:nvPr>
+            <p:ph type="title"/>
+          </p:nvPr>
+        </p:nvSpPr>
+        <p:spPr/>
+        <p:txBody>
+          <a:bodyPr/>
+          <a:lstStyle/>
+          <a:p>
+            <a:r>
+              <a:rPr lang="en-US" dirty="0"/>
+              <a:t>Summary</a:t>
+            </a:r>
+          </a:p>
+        </p:txBody>
+      </p:sp>
+      <p:sp>
+        <p:nvSpPr>
+          <p:cNvPr id="3" name="Content Placeholder 2">
+            <a:extLst>
+              <a:ext uri="{FF2B5EF4-FFF2-40B4-BE49-F238E27FC236}">
+                <a16:creationId xmlns:a16="http://schemas.microsoft.com/office/drawing/2014/main" id="{43C89502-E656-407B-A470-37DADF5D6AE2}"/>
+              </a:ext>
+            </a:extLst>
+          </p:cNvPr>
+          <p:cNvSpPr>
+            <a:spLocks noGrp="1"/>
+          </p:cNvSpPr>
+          <p:nvPr>
+            <p:ph idx="1"/>
+          </p:nvPr>
+        </p:nvSpPr>
+        <p:spPr>
+          <a:xfrm>
+            <a:off x="457200" y="1197405"/>
+            <a:ext cx="7238999" cy="3576168"/>
+          </a:xfrm>
+        </p:spPr>
+        <p:txBody>
+          <a:bodyPr>
+            <a:normAutofit fontScale="85000" lnSpcReduction="20000"/>
+          </a:bodyPr>
+          <a:lstStyle/>
+          <a:p>
+            <a:r>
+              <a:rPr lang="en-US" dirty="0"/>
+              <a:t>I may have left you with the impression class code </a:t>
+            </a:r>
+            <a:r>
+              <a:rPr lang="en-US" b="1" i="1" dirty="0"/>
+              <a:t>needs</a:t>
+            </a:r>
+            <a:r>
+              <a:rPr lang="en-US" dirty="0"/>
+              <a:t> to be in separate files. </a:t>
+            </a:r>
+            <a:r>
+              <a:rPr lang="en-US" b="1" i="1" dirty="0"/>
+              <a:t>This is not so ...</a:t>
+            </a:r>
+          </a:p>
+          <a:p>
+            <a:r>
+              <a:rPr lang="en-US" dirty="0"/>
+              <a:t>You </a:t>
+            </a:r>
+            <a:r>
+              <a:rPr lang="en-US" b="1" dirty="0"/>
+              <a:t>could</a:t>
+            </a:r>
+            <a:r>
+              <a:rPr lang="en-US" dirty="0"/>
+              <a:t> put class code right in your sketch</a:t>
+            </a:r>
+          </a:p>
+          <a:p>
+            <a:r>
+              <a:rPr lang="en-US" dirty="0"/>
+              <a:t>Yes – there is only one file to maintain.</a:t>
+            </a:r>
+          </a:p>
+          <a:p>
+            <a:r>
+              <a:rPr lang="en-US" dirty="0"/>
+              <a:t>But lose a key advantage – libraries and code sharing</a:t>
+            </a:r>
+          </a:p>
+          <a:p>
+            <a:r>
+              <a:rPr lang="en-US" dirty="0"/>
+              <a:t>And a big drawback is that the hidden complexity is now back in plain view.</a:t>
+            </a:r>
+          </a:p>
+          <a:p>
+            <a:r>
+              <a:rPr lang="en-US" dirty="0"/>
+              <a:t>I did not mention it last time as it is not typical to put all code in one file but it can be done and is fine for development.</a:t>
+            </a:r>
+          </a:p>
+        </p:txBody>
+      </p:sp>
+    </p:spTree>
+    <p:extLst>
+      <p:ext uri="{BB962C8B-B14F-4D97-AF65-F5344CB8AC3E}">
+        <p14:creationId xmlns:p14="http://schemas.microsoft.com/office/powerpoint/2010/main" val="4001298897"/>
+      </p:ext>
+    </p:extLst>
+  </p:cSld>
+  <p:clrMapOvr>
+    <a:masterClrMapping/>
+  </p:clrMapOvr>
+  <p:timing>
+    <p:tnLst>
+      <p:par>
+        <p:cTn id="1" dur="indefinite" restart="never" nodeType="tmRoot">
+          <p:childTnLst>
+            <p:seq concurrent="1" nextAc="seek">
+              <p:cTn id="2" dur="indefinite" nodeType="mainSeq">
+                <p:childTnLst>
+                  <p:par>
+                    <p:cTn id="3" fill="hold">
+                      <p:stCondLst>
+                        <p:cond delay="indefinite"/>
+                      </p:stCondLst>
+                      <p:childTnLst>
+                        <p:par>
+                          <p:cTn id="4" fill="hold">
+                            <p:stCondLst>
+                              <p:cond delay="0"/>
+                            </p:stCondLst>
+                            <p:childTnLst>
+                              <p:par>
+                                <p:cTn id="5" presetID="1" presetClass="entr" presetSubtype="0" fill="hold" nodeType="clickEffect">
+                                  <p:stCondLst>
+                                    <p:cond delay="0"/>
+                                  </p:stCondLst>
+                                  <p:childTnLst>
+                                    <p:set>
+                                      <p:cBhvr>
+                                        <p:cTn id="6" dur="1" fill="hold">
+                                          <p:stCondLst>
+                                            <p:cond delay="0"/>
+                                          </p:stCondLst>
+                                        </p:cTn>
+                                        <p:tgtEl>
+                                          <p:spTgt spid="3">
+                                            <p:txEl>
+                                              <p:pRg st="0" end="0"/>
+                                            </p:txEl>
+                                          </p:spTgt>
+                                        </p:tgtEl>
+                                        <p:attrNameLst>
+                                          <p:attrName>style.visibility</p:attrName>
+                                        </p:attrNameLst>
+                                      </p:cBhvr>
+                                      <p:to>
+                                        <p:strVal val="visible"/>
+                                      </p:to>
+                                    </p:set>
+                                  </p:childTnLst>
+                                  <p:subTnLst>
+                                    <p:animClr clrSpc="rgb" dir="cw">
+                                      <p:cBhvr override="childStyle">
+                                        <p:cTn dur="1" fill="hold" display="0" masterRel="nextClick" afterEffect="1"/>
+                                        <p:tgtEl>
+                                          <p:spTgt spid="3">
+                                            <p:txEl>
+                                              <p:pRg st="0" end="0"/>
+                                            </p:txEl>
+                                          </p:spTgt>
+                                        </p:tgtEl>
+                                        <p:attrNameLst>
+                                          <p:attrName>ppt_c</p:attrName>
+                                        </p:attrNameLst>
+                                      </p:cBhvr>
+                                      <p:to>
+                                        <a:schemeClr val="bg2"/>
+                                      </p:to>
+                                    </p:animClr>
+                                  </p:subTnLst>
+                                </p:cTn>
+                              </p:par>
+                              <p:par>
+                                <p:cTn id="7" presetID="10" presetClass="entr" presetSubtype="0" fill="hold" nodeType="withEffect">
+                                  <p:stCondLst>
+                                    <p:cond delay="0"/>
+                                  </p:stCondLst>
+                                  <p:childTnLst>
+                                    <p:set>
+                                      <p:cBhvr>
+                                        <p:cTn id="8" dur="1" fill="hold">
+                                          <p:stCondLst>
+                                            <p:cond delay="0"/>
+                                          </p:stCondLst>
+                                        </p:cTn>
+                                        <p:tgtEl>
+                                          <p:spTgt spid="3">
+                                            <p:txEl>
+                                              <p:pRg st="5" end="5"/>
+                                            </p:txEl>
+                                          </p:spTgt>
+                                        </p:tgtEl>
+                                        <p:attrNameLst>
+                                          <p:attrName>style.visibility</p:attrName>
+                                        </p:attrNameLst>
+                                      </p:cBhvr>
+                                      <p:to>
+                                        <p:strVal val="visible"/>
+                                      </p:to>
+                                    </p:set>
+                                    <p:animEffect transition="in" filter="fade">
+                                      <p:cBhvr>
+                                        <p:cTn id="9" dur="500"/>
+                                        <p:tgtEl>
+                                          <p:spTgt spid="3">
+                                            <p:txEl>
+                                              <p:pRg st="5" end="5"/>
+                                            </p:txEl>
+                                          </p:spTgt>
+                                        </p:tgtEl>
+                                      </p:cBhvr>
+                                    </p:animEffect>
+                                  </p:childTnLst>
+                                  <p:subTnLst>
+                                    <p:animClr clrSpc="rgb" dir="cw">
+                                      <p:cBhvr override="childStyle">
+                                        <p:cTn dur="1" fill="hold" display="0" masterRel="nextClick" afterEffect="1"/>
+                                        <p:tgtEl>
+                                          <p:spTgt spid="3">
+                                            <p:txEl>
+                                              <p:pRg st="5" end="5"/>
+                                            </p:txEl>
+                                          </p:spTgt>
+                                        </p:tgtEl>
+                                        <p:attrNameLst>
+                                          <p:attrName>ppt_c</p:attrName>
+                                        </p:attrNameLst>
+                                      </p:cBhvr>
+                                      <p:to>
+                                        <a:schemeClr val="bg2"/>
+                                      </p:to>
+                                    </p:animClr>
+                                  </p:subTnLst>
+                                </p:cTn>
+                              </p:par>
+                            </p:childTnLst>
+                          </p:cTn>
+                        </p:par>
+                      </p:childTnLst>
+                    </p:cTn>
+                  </p:par>
+                  <p:par>
+                    <p:cTn id="10" fill="hold">
+                      <p:stCondLst>
+                        <p:cond delay="indefinite"/>
+                      </p:stCondLst>
+                      <p:childTnLst>
+                        <p:par>
+                          <p:cTn id="11" fill="hold">
+                            <p:stCondLst>
+                              <p:cond delay="0"/>
+                            </p:stCondLst>
+                            <p:childTnLst>
+                              <p:par>
+                                <p:cTn id="12" presetID="10" presetClass="entr" presetSubtype="0" fill="hold" nodeType="clickEffect">
+                                  <p:stCondLst>
+                                    <p:cond delay="0"/>
+                                  </p:stCondLst>
+                                  <p:childTnLst>
+                                    <p:set>
+                                      <p:cBhvr>
+                                        <p:cTn id="13" dur="1" fill="hold">
+                                          <p:stCondLst>
+                                            <p:cond delay="0"/>
+                                          </p:stCondLst>
+                                        </p:cTn>
+                                        <p:tgtEl>
+                                          <p:spTgt spid="3">
+                                            <p:txEl>
+                                              <p:pRg st="1" end="1"/>
+                                            </p:txEl>
+                                          </p:spTgt>
+                                        </p:tgtEl>
+                                        <p:attrNameLst>
+                                          <p:attrName>style.visibility</p:attrName>
+                                        </p:attrNameLst>
+                                      </p:cBhvr>
+                                      <p:to>
+                                        <p:strVal val="visible"/>
+                                      </p:to>
+                                    </p:set>
+                                    <p:animEffect transition="in" filter="fade">
+                                      <p:cBhvr>
+                                        <p:cTn id="14" dur="500"/>
+                                        <p:tgtEl>
+                                          <p:spTgt spid="3">
+                                            <p:txEl>
+                                              <p:pRg st="1" end="1"/>
+                                            </p:txEl>
+                                          </p:spTgt>
+                                        </p:tgtEl>
+                                      </p:cBhvr>
+                                    </p:animEffect>
+                                  </p:childTnLst>
+                                </p:cTn>
+                              </p:par>
+                            </p:childTnLst>
+                          </p:cTn>
+                        </p:par>
+                      </p:childTnLst>
+                    </p:cTn>
+                  </p:par>
+                  <p:par>
+                    <p:cTn id="15" fill="hold">
+                      <p:stCondLst>
+                        <p:cond delay="indefinite"/>
+                      </p:stCondLst>
+                      <p:childTnLst>
+                        <p:par>
+                          <p:cTn id="16" fill="hold">
+                            <p:stCondLst>
+                              <p:cond delay="0"/>
+                            </p:stCondLst>
+                            <p:childTnLst>
+                              <p:par>
+                                <p:cTn id="17" presetID="10" presetClass="entr" presetSubtype="0" fill="hold" nodeType="clickEffect">
+                                  <p:stCondLst>
+                                    <p:cond delay="0"/>
+                                  </p:stCondLst>
+                                  <p:childTnLst>
+                                    <p:set>
+                                      <p:cBhvr>
+                                        <p:cTn id="18" dur="1" fill="hold">
+                                          <p:stCondLst>
+                                            <p:cond delay="0"/>
+                                          </p:stCondLst>
+                                        </p:cTn>
+                                        <p:tgtEl>
+                                          <p:spTgt spid="3">
+                                            <p:txEl>
+                                              <p:pRg st="2" end="2"/>
+                                            </p:txEl>
+                                          </p:spTgt>
+                                        </p:tgtEl>
+                                        <p:attrNameLst>
+                                          <p:attrName>style.visibility</p:attrName>
+                                        </p:attrNameLst>
+                                      </p:cBhvr>
+                                      <p:to>
+                                        <p:strVal val="visible"/>
+                                      </p:to>
+                                    </p:set>
+                                    <p:animEffect transition="in" filter="fade">
+                                      <p:cBhvr>
+                                        <p:cTn id="19" dur="500"/>
+                                        <p:tgtEl>
+                                          <p:spTgt spid="3">
+                                            <p:txEl>
+                                              <p:pRg st="2" end="2"/>
+                                            </p:txEl>
+                                          </p:spTgt>
+                                        </p:tgtEl>
+                                      </p:cBhvr>
+                                    </p:animEffect>
+                                  </p:childTnLst>
+                                </p:cTn>
+                              </p:par>
+                            </p:childTnLst>
+                          </p:cTn>
+                        </p:par>
+                      </p:childTnLst>
+                    </p:cTn>
+                  </p:par>
+                  <p:par>
+                    <p:cTn id="20" fill="hold">
+                      <p:stCondLst>
+                        <p:cond delay="indefinite"/>
+                      </p:stCondLst>
+                      <p:childTnLst>
+                        <p:par>
+                          <p:cTn id="21" fill="hold">
+                            <p:stCondLst>
+                              <p:cond delay="0"/>
+                            </p:stCondLst>
+                            <p:childTnLst>
+                              <p:par>
+                                <p:cTn id="22" presetID="10" presetClass="entr" presetSubtype="0" fill="hold" nodeType="clickEffect">
+                                  <p:stCondLst>
+                                    <p:cond delay="0"/>
+                                  </p:stCondLst>
+                                  <p:childTnLst>
+                                    <p:set>
+                                      <p:cBhvr>
+                                        <p:cTn id="23" dur="1" fill="hold">
+                                          <p:stCondLst>
+                                            <p:cond delay="0"/>
+                                          </p:stCondLst>
+                                        </p:cTn>
+                                        <p:tgtEl>
+                                          <p:spTgt spid="3">
+                                            <p:txEl>
+                                              <p:pRg st="3" end="3"/>
+                                            </p:txEl>
+                                          </p:spTgt>
+                                        </p:tgtEl>
+                                        <p:attrNameLst>
+                                          <p:attrName>style.visibility</p:attrName>
+                                        </p:attrNameLst>
+                                      </p:cBhvr>
+                                      <p:to>
+                                        <p:strVal val="visible"/>
+                                      </p:to>
+                                    </p:set>
+                                    <p:animEffect transition="in" filter="fade">
+                                      <p:cBhvr>
+                                        <p:cTn id="24" dur="500"/>
+                                        <p:tgtEl>
+                                          <p:spTgt spid="3">
+                                            <p:txEl>
+                                              <p:pRg st="3" end="3"/>
+                                            </p:txEl>
+                                          </p:spTgt>
+                                        </p:tgtEl>
+                                      </p:cBhvr>
+                                    </p:animEffect>
+                                  </p:childTnLst>
+                                </p:cTn>
+                              </p:par>
+                            </p:childTnLst>
+                          </p:cTn>
+                        </p:par>
+                      </p:childTnLst>
+                    </p:cTn>
+                  </p:par>
+                  <p:par>
+                    <p:cTn id="25" fill="hold">
+                      <p:stCondLst>
+                        <p:cond delay="indefinite"/>
+                      </p:stCondLst>
+                      <p:childTnLst>
+                        <p:par>
+                          <p:cTn id="26" fill="hold">
+                            <p:stCondLst>
+                              <p:cond delay="0"/>
+                            </p:stCondLst>
+                            <p:childTnLst>
+                              <p:par>
+                                <p:cTn id="27" presetID="10" presetClass="entr" presetSubtype="0" fill="hold" nodeType="clickEffect">
+                                  <p:stCondLst>
+                                    <p:cond delay="0"/>
+                                  </p:stCondLst>
+                                  <p:childTnLst>
+                                    <p:set>
+                                      <p:cBhvr>
+                                        <p:cTn id="28" dur="1" fill="hold">
+                                          <p:stCondLst>
+                                            <p:cond delay="0"/>
+                                          </p:stCondLst>
+                                        </p:cTn>
+                                        <p:tgtEl>
+                                          <p:spTgt spid="3">
+                                            <p:txEl>
+                                              <p:pRg st="4" end="4"/>
+                                            </p:txEl>
+                                          </p:spTgt>
+                                        </p:tgtEl>
+                                        <p:attrNameLst>
+                                          <p:attrName>style.visibility</p:attrName>
+                                        </p:attrNameLst>
+                                      </p:cBhvr>
+                                      <p:to>
+                                        <p:strVal val="visible"/>
+                                      </p:to>
+                                    </p:set>
+                                    <p:animEffect transition="in" filter="fade">
+                                      <p:cBhvr>
+                                        <p:cTn id="29" dur="500"/>
+                                        <p:tgtEl>
+                                          <p:spTgt spid="3">
+                                            <p:txEl>
+                                              <p:pRg st="4" end="4"/>
+                                            </p:txEl>
+                                          </p:spTgt>
+                                        </p:tgtEl>
+                                      </p:cBhvr>
+                                    </p:animEffect>
+                                  </p:childTnLst>
+                                </p:cTn>
+                              </p:par>
+                            </p:childTnLst>
+                          </p:cTn>
+                        </p:par>
+                      </p:childTnLst>
+                    </p:cTn>
+                  </p:par>
+                </p:childTnLst>
+              </p:cTn>
+              <p:prevCondLst>
+                <p:cond evt="onPrev" delay="0">
+                  <p:tgtEl>
+                    <p:sldTgt/>
+                  </p:tgtEl>
+                </p:cond>
+              </p:prevCondLst>
+              <p:nextCondLst>
+                <p:cond evt="onNext" delay="0">
+                  <p:tgtEl>
+                    <p:sldTgt/>
+                  </p:tgtEl>
+                </p:cond>
+              </p:nextCondLst>
+            </p:seq>
+          </p:childTnLst>
+        </p:cTn>
+      </p:par>
+    </p:tnLst>
+  </p:timing>
+</p:sld>
+</file>
+
 <file path=ppt/slides/slide12.xml><?xml version="1.0" encoding="utf-8"?>
 <p:sld xmlns:a="http://schemas.openxmlformats.org/drawingml/2006/main" xmlns:r="http://schemas.openxmlformats.org/officeDocument/2006/relationships" xmlns:p="http://schemas.openxmlformats.org/presentationml/2006/main">
   <p:cSld>
@@ -14117,7 +13995,7 @@
                   <a:schemeClr val="tx1"/>
                 </a:solidFill>
               </a:rPr>
-              <a:t>Define what the functions look like</a:t>
+              <a:t>Define types and what functions are available.</a:t>
             </a:r>
           </a:p>
         </p:txBody>
@@ -14709,8 +14587,8 @@
         </p:nvSpPr>
         <p:spPr>
           <a:xfrm>
-            <a:off x="426721" y="899161"/>
-            <a:ext cx="7275272" cy="2891790"/>
+            <a:off x="426721" y="899160"/>
+            <a:ext cx="7275272" cy="3196589"/>
           </a:xfrm>
         </p:spPr>
         <p:txBody>
@@ -14751,7 +14629,7 @@
           <a:p>
             <a:r>
               <a:rPr lang="en-US" sz="2000" dirty="0"/>
-              <a:t>Each defined item is called a ‘</a:t>
+              <a:t>Each function is declared with its name and its </a:t>
             </a:r>
             <a:r>
               <a:rPr lang="en-US" sz="2000" b="1" dirty="0"/>
@@ -14759,7 +14637,7 @@
             </a:r>
             <a:r>
               <a:rPr lang="en-US" sz="2000" dirty="0"/>
-              <a:t>’.</a:t>
+              <a:t>.</a:t>
             </a:r>
           </a:p>
           <a:p>
@@ -14769,24 +14647,15 @@
             </a:r>
             <a:r>
               <a:rPr lang="en-US" sz="2000" dirty="0"/>
-              <a:t> = strict definition of  passed variable types, their order, and also the returned variable type. This is very important so the compiler knows later on (in your sketch) what is a expected for the variables or function calls. </a:t>
+              <a:t> = A strict definition of  passed variable types, their order, and also the returned variable type. This is very important so the compiler knows later on (in your sketch) what is a expected for that function call.  Programmers will refer to the ‘signature’ of the prototype – another way of saying it’s uniqueness.</a:t>
             </a:r>
           </a:p>
           <a:p>
             <a:r>
               <a:rPr lang="en-US" sz="2000" dirty="0"/>
-              <a:t>Note: You can have variations of similar function calls but each one has a distinct ‘signature’ </a:t>
-            </a:r>
-            <a:r>
-              <a:rPr lang="en-US" sz="2100" dirty="0"/>
-              <a:t>A type signature includes the number, types and order of the arguments contained by a function.</a:t>
-            </a:r>
-          </a:p>
-          <a:p>
-            <a:r>
-              <a:rPr lang="en-US" sz="2100" dirty="0"/>
-              <a:t>We will see later the Led2 class has two constructors (with different signatures)</a:t>
-            </a:r>
+              <a:t>We will see later my Led2 class has two constructors (with different signatures). Note: when you have several function declarations with the same name but where the parameter types are different it is called overloading the function. As long as each call has a distinct ‘signature’ it is ok.</a:t>
+            </a:r>
+            <a:endParaRPr lang="en-US" sz="2100" dirty="0"/>
           </a:p>
           <a:p>
             <a:r>
@@ -14797,7 +14666,7 @@
           <a:p>
             <a:r>
               <a:rPr lang="en-US" sz="2000" b="1" dirty="0"/>
-              <a:t>One Line from the header file: </a:t>
+              <a:t>Here is one Line from the header file: </a:t>
             </a:r>
           </a:p>
         </p:txBody>
@@ -15583,7 +15452,7 @@
                             </p:stCondLst>
                             <p:childTnLst>
                               <p:par>
-                                <p:cTn id="47" presetID="42" presetClass="entr" presetSubtype="0" fill="hold" nodeType="clickEffect">
+                                <p:cTn id="47" presetID="42" presetClass="entr" presetSubtype="0" fill="hold" grpId="0" nodeType="clickEffect">
                                   <p:stCondLst>
                                     <p:cond delay="0"/>
                                   </p:stCondLst>
@@ -15591,121 +15460,6 @@
                                     <p:set>
                                       <p:cBhvr>
                                         <p:cTn id="48" dur="1" fill="hold">
-                                          <p:stCondLst>
-                                            <p:cond delay="0"/>
-                                          </p:stCondLst>
-                                        </p:cTn>
-                                        <p:tgtEl>
-                                          <p:spTgt spid="6">
-                                            <p:txEl>
-                                              <p:pRg st="6" end="6"/>
-                                            </p:txEl>
-                                          </p:spTgt>
-                                        </p:tgtEl>
-                                        <p:attrNameLst>
-                                          <p:attrName>style.visibility</p:attrName>
-                                        </p:attrNameLst>
-                                      </p:cBhvr>
-                                      <p:to>
-                                        <p:strVal val="visible"/>
-                                      </p:to>
-                                    </p:set>
-                                    <p:animEffect transition="in" filter="fade">
-                                      <p:cBhvr>
-                                        <p:cTn id="49" dur="1000"/>
-                                        <p:tgtEl>
-                                          <p:spTgt spid="6">
-                                            <p:txEl>
-                                              <p:pRg st="6" end="6"/>
-                                            </p:txEl>
-                                          </p:spTgt>
-                                        </p:tgtEl>
-                                      </p:cBhvr>
-                                    </p:animEffect>
-                                    <p:anim calcmode="lin" valueType="num">
-                                      <p:cBhvr>
-                                        <p:cTn id="50" dur="1000" fill="hold"/>
-                                        <p:tgtEl>
-                                          <p:spTgt spid="6">
-                                            <p:txEl>
-                                              <p:pRg st="6" end="6"/>
-                                            </p:txEl>
-                                          </p:spTgt>
-                                        </p:tgtEl>
-                                        <p:attrNameLst>
-                                          <p:attrName>ppt_x</p:attrName>
-                                        </p:attrNameLst>
-                                      </p:cBhvr>
-                                      <p:tavLst>
-                                        <p:tav tm="0">
-                                          <p:val>
-                                            <p:strVal val="#ppt_x"/>
-                                          </p:val>
-                                        </p:tav>
-                                        <p:tav tm="100000">
-                                          <p:val>
-                                            <p:strVal val="#ppt_x"/>
-                                          </p:val>
-                                        </p:tav>
-                                      </p:tavLst>
-                                    </p:anim>
-                                    <p:anim calcmode="lin" valueType="num">
-                                      <p:cBhvr>
-                                        <p:cTn id="51" dur="1000" fill="hold"/>
-                                        <p:tgtEl>
-                                          <p:spTgt spid="6">
-                                            <p:txEl>
-                                              <p:pRg st="6" end="6"/>
-                                            </p:txEl>
-                                          </p:spTgt>
-                                        </p:tgtEl>
-                                        <p:attrNameLst>
-                                          <p:attrName>ppt_y</p:attrName>
-                                        </p:attrNameLst>
-                                      </p:cBhvr>
-                                      <p:tavLst>
-                                        <p:tav tm="0">
-                                          <p:val>
-                                            <p:strVal val="#ppt_y+.1"/>
-                                          </p:val>
-                                        </p:tav>
-                                        <p:tav tm="100000">
-                                          <p:val>
-                                            <p:strVal val="#ppt_y"/>
-                                          </p:val>
-                                        </p:tav>
-                                      </p:tavLst>
-                                    </p:anim>
-                                  </p:childTnLst>
-                                </p:cTn>
-                              </p:par>
-                            </p:childTnLst>
-                          </p:cTn>
-                        </p:par>
-                      </p:childTnLst>
-                    </p:cTn>
-                  </p:par>
-                  <p:par>
-                    <p:cTn id="52" fill="hold">
-                      <p:stCondLst>
-                        <p:cond delay="indefinite"/>
-                      </p:stCondLst>
-                      <p:childTnLst>
-                        <p:par>
-                          <p:cTn id="53" fill="hold">
-                            <p:stCondLst>
-                              <p:cond delay="0"/>
-                            </p:stCondLst>
-                            <p:childTnLst>
-                              <p:par>
-                                <p:cTn id="54" presetID="42" presetClass="entr" presetSubtype="0" fill="hold" grpId="0" nodeType="clickEffect">
-                                  <p:stCondLst>
-                                    <p:cond delay="0"/>
-                                  </p:stCondLst>
-                                  <p:childTnLst>
-                                    <p:set>
-                                      <p:cBhvr>
-                                        <p:cTn id="55" dur="1" fill="hold">
                                           <p:stCondLst>
                                             <p:cond delay="0"/>
                                           </p:stCondLst>
@@ -15723,7 +15477,7 @@
                                     </p:set>
                                     <p:animEffect transition="in" filter="fade">
                                       <p:cBhvr>
-                                        <p:cTn id="56" dur="1000"/>
+                                        <p:cTn id="49" dur="1000"/>
                                         <p:tgtEl>
                                           <p:spTgt spid="7"/>
                                         </p:tgtEl>
@@ -15731,7 +15485,7 @@
                                     </p:animEffect>
                                     <p:anim calcmode="lin" valueType="num">
                                       <p:cBhvr>
-                                        <p:cTn id="57" dur="1000" fill="hold"/>
+                                        <p:cTn id="50" dur="1000" fill="hold"/>
                                         <p:tgtEl>
                                           <p:spTgt spid="7"/>
                                         </p:tgtEl>
@@ -15754,7 +15508,7 @@
                                     </p:anim>
                                     <p:anim calcmode="lin" valueType="num">
                                       <p:cBhvr>
-                                        <p:cTn id="58" dur="1000" fill="hold"/>
+                                        <p:cTn id="51" dur="1000" fill="hold"/>
                                         <p:tgtEl>
                                           <p:spTgt spid="7"/>
                                         </p:tgtEl>
@@ -16169,7 +15923,7 @@
                 <a:latin typeface="Courier New" panose="02070309020205020404" pitchFamily="49" charset="0"/>
                 <a:cs typeface="Courier New" panose="02070309020205020404" pitchFamily="49" charset="0"/>
               </a:rPr>
-              <a:t>    Led2(byte pin);                     // Simple default definition </a:t>
+              <a:t>    Led2(byte pin);                     // Prototype for simple constructor </a:t>
             </a:r>
           </a:p>
           <a:p>
@@ -28392,8 +28146,8 @@
         </p:nvSpPr>
         <p:spPr>
           <a:xfrm>
-            <a:off x="498687" y="603335"/>
-            <a:ext cx="7232226" cy="4401205"/>
+            <a:off x="498686" y="603335"/>
+            <a:ext cx="8340514" cy="4185761"/>
           </a:xfrm>
           <a:prstGeom prst="rect">
             <a:avLst/>
@@ -28714,7 +28468,7 @@
                 <a:latin typeface="Courier New" panose="02070309020205020404" pitchFamily="49" charset="0"/>
                 <a:cs typeface="Courier New" panose="02070309020205020404" pitchFamily="49" charset="0"/>
               </a:rPr>
-              <a:t>    Led2(byte pin);                     // Simple default definition without a pre specified on and off time.</a:t>
+              <a:t>    Led2(byte pin);                     // Prototype for simple constructor </a:t>
             </a:r>
           </a:p>
           <a:p>
@@ -28723,7 +28477,7 @@
                 <a:latin typeface="Courier New" panose="02070309020205020404" pitchFamily="49" charset="0"/>
                 <a:cs typeface="Courier New" panose="02070309020205020404" pitchFamily="49" charset="0"/>
               </a:rPr>
-              <a:t>    Led2(byte pin, unsigned long on, unsigned long off);  // this definition includes the on and off time values from the outset</a:t>
+              <a:t>    Led2(byte pin, unsigned long on, unsigned long off);  // this constructor includes the on and off time values</a:t>
             </a:r>
           </a:p>
           <a:p>
@@ -28755,7 +28509,7 @@
                 <a:latin typeface="Courier New" panose="02070309020205020404" pitchFamily="49" charset="0"/>
                 <a:cs typeface="Courier New" panose="02070309020205020404" pitchFamily="49" charset="0"/>
               </a:rPr>
-              <a:t>();                    // Return the current state of LED (on / off) Allows parts of your code to run only when LED is on for example.</a:t>
+              <a:t>();                    // Return the current state of LED (on / off)</a:t>
             </a:r>
           </a:p>
           <a:p>
@@ -29189,7 +28943,7 @@
         <p:spPr>
           <a:xfrm>
             <a:off x="457200" y="742950"/>
-            <a:ext cx="6934200" cy="2246769"/>
+            <a:ext cx="6934200" cy="2139047"/>
           </a:xfrm>
           <a:prstGeom prst="rect">
             <a:avLst/>
@@ -29222,7 +28976,7 @@
                 <a:latin typeface="Courier New" panose="02070309020205020404" pitchFamily="49" charset="0"/>
                 <a:cs typeface="Courier New" panose="02070309020205020404" pitchFamily="49" charset="0"/>
               </a:rPr>
-              <a:t>Led2::Led2(byte pin) {</a:t>
+              <a:t>Led2::Led2(byte pin) {       // simple constructor </a:t>
             </a:r>
           </a:p>
           <a:p>
@@ -29231,16 +28985,7 @@
                 <a:latin typeface="Courier New" panose="02070309020205020404" pitchFamily="49" charset="0"/>
                 <a:cs typeface="Courier New" panose="02070309020205020404" pitchFamily="49" charset="0"/>
               </a:rPr>
-              <a:t>  // Save the passed pin</a:t>
-            </a:r>
-          </a:p>
-          <a:p>
-            <a:r>
-              <a:rPr lang="en-US" sz="700" dirty="0">
-                <a:latin typeface="Courier New" panose="02070309020205020404" pitchFamily="49" charset="0"/>
-                <a:cs typeface="Courier New" panose="02070309020205020404" pitchFamily="49" charset="0"/>
-              </a:rPr>
-              <a:t>  _pin = pin;</a:t>
+              <a:t>  _pin = pin;                // Save the passed pin</a:t>
             </a:r>
           </a:p>
           <a:p>
@@ -29351,21 +29096,7 @@
                 <a:latin typeface="Courier New" panose="02070309020205020404" pitchFamily="49" charset="0"/>
                 <a:cs typeface="Courier New" panose="02070309020205020404" pitchFamily="49" charset="0"/>
               </a:rPr>
-              <a:t> = off;           // </a:t>
-            </a:r>
-            <a:r>
-              <a:rPr lang="en-US" sz="700" dirty="0" err="1">
-                <a:latin typeface="Courier New" panose="02070309020205020404" pitchFamily="49" charset="0"/>
-                <a:cs typeface="Courier New" panose="02070309020205020404" pitchFamily="49" charset="0"/>
-              </a:rPr>
-              <a:t>Initializion</a:t>
-            </a:r>
-            <a:r>
-              <a:rPr lang="en-US" sz="700" dirty="0">
-                <a:latin typeface="Courier New" panose="02070309020205020404" pitchFamily="49" charset="0"/>
-                <a:cs typeface="Courier New" panose="02070309020205020404" pitchFamily="49" charset="0"/>
-              </a:rPr>
-              <a:t> code is kept separate just for clarity.</a:t>
+              <a:t> = off;           // Initializing code is kept separate just for clarity.</a:t>
             </a:r>
           </a:p>
           <a:p>
@@ -39752,13 +39483,7 @@
       </p:grpSpPr>
       <p:sp>
         <p:nvSpPr>
-          <p:cNvPr id="2" name="Title 1">
-            <a:extLst>
-              <a:ext uri="{FF2B5EF4-FFF2-40B4-BE49-F238E27FC236}">
-                <a16:creationId xmlns:a16="http://schemas.microsoft.com/office/drawing/2014/main" id="{AA0F3F4A-B72A-4896-8807-D94D8A7E019C}"/>
-              </a:ext>
-            </a:extLst>
-          </p:cNvPr>
+          <p:cNvPr id="4" name="Title 3"/>
           <p:cNvSpPr>
             <a:spLocks noGrp="1"/>
           </p:cNvSpPr>
@@ -39766,107 +39491,463 @@
             <p:ph type="title"/>
           </p:nvPr>
         </p:nvSpPr>
-        <p:spPr/>
+        <p:spPr>
+          <a:xfrm>
+            <a:off x="457200" y="376238"/>
+            <a:ext cx="7016194" cy="602252"/>
+          </a:xfrm>
+        </p:spPr>
         <p:txBody>
-          <a:bodyPr/>
+          <a:bodyPr>
+            <a:normAutofit fontScale="90000"/>
+          </a:bodyPr>
           <a:lstStyle/>
           <a:p>
             <a:r>
               <a:rPr lang="en-US" dirty="0"/>
-              <a:t>All in One Approach</a:t>
+              <a:t>Typical File Arrangement</a:t>
+            </a:r>
+          </a:p>
+        </p:txBody>
+      </p:sp>
+      <p:pic>
+        <p:nvPicPr>
+          <p:cNvPr id="26" name="Picture 25">
+            <a:extLst>
+              <a:ext uri="{FF2B5EF4-FFF2-40B4-BE49-F238E27FC236}">
+                <a16:creationId xmlns:a16="http://schemas.microsoft.com/office/drawing/2014/main" id="{C2E5F3F1-C711-44AB-9F70-E67D2E44F1AC}"/>
+              </a:ext>
+            </a:extLst>
+          </p:cNvPr>
+          <p:cNvPicPr>
+            <a:picLocks noChangeAspect="1"/>
+          </p:cNvPicPr>
+          <p:nvPr/>
+        </p:nvPicPr>
+        <p:blipFill>
+          <a:blip r:embed="rId3" cstate="print">
+            <a:extLst>
+              <a:ext uri="{28A0092B-C50C-407E-A947-70E740481C1C}">
+                <a14:useLocalDpi xmlns:a14="http://schemas.microsoft.com/office/drawing/2010/main" val="0"/>
+              </a:ext>
+            </a:extLst>
+          </a:blip>
+          <a:stretch>
+            <a:fillRect/>
+          </a:stretch>
+        </p:blipFill>
+        <p:spPr>
+          <a:xfrm>
+            <a:off x="7848600" y="4583336"/>
+            <a:ext cx="1028700" cy="457771"/>
+          </a:xfrm>
+          <a:prstGeom prst="rect">
+            <a:avLst/>
+          </a:prstGeom>
+        </p:spPr>
+      </p:pic>
+      <p:sp>
+        <p:nvSpPr>
+          <p:cNvPr id="2" name="Rectangle 1">
+            <a:extLst>
+              <a:ext uri="{FF2B5EF4-FFF2-40B4-BE49-F238E27FC236}">
+                <a16:creationId xmlns:a16="http://schemas.microsoft.com/office/drawing/2014/main" id="{E4033C97-9E42-438B-9F64-FCDB315673E9}"/>
+              </a:ext>
+            </a:extLst>
+          </p:cNvPr>
+          <p:cNvSpPr/>
+          <p:nvPr/>
+        </p:nvSpPr>
+        <p:spPr>
+          <a:xfrm>
+            <a:off x="1143000" y="1962150"/>
+            <a:ext cx="2057400" cy="1219200"/>
+          </a:xfrm>
+          <a:prstGeom prst="rect">
+            <a:avLst/>
+          </a:prstGeom>
+        </p:spPr>
+        <p:style>
+          <a:lnRef idx="2">
+            <a:schemeClr val="accent1">
+              <a:shade val="50000"/>
+            </a:schemeClr>
+          </a:lnRef>
+          <a:fillRef idx="1">
+            <a:schemeClr val="accent1"/>
+          </a:fillRef>
+          <a:effectRef idx="0">
+            <a:schemeClr val="accent1"/>
+          </a:effectRef>
+          <a:fontRef idx="minor">
+            <a:schemeClr val="lt1"/>
+          </a:fontRef>
+        </p:style>
+        <p:txBody>
+          <a:bodyPr rtlCol="0" anchor="ctr"/>
+          <a:lstStyle/>
+          <a:p>
+            <a:pPr algn="ctr"/>
+            <a:r>
+              <a:rPr lang="en-US" dirty="0"/>
+              <a:t>Sketch</a:t>
             </a:r>
           </a:p>
         </p:txBody>
       </p:sp>
       <p:sp>
         <p:nvSpPr>
-          <p:cNvPr id="3" name="Content Placeholder 2">
+          <p:cNvPr id="10" name="Rectangle 9">
             <a:extLst>
               <a:ext uri="{FF2B5EF4-FFF2-40B4-BE49-F238E27FC236}">
-                <a16:creationId xmlns:a16="http://schemas.microsoft.com/office/drawing/2014/main" id="{43C89502-E656-407B-A470-37DADF5D6AE2}"/>
+                <a16:creationId xmlns:a16="http://schemas.microsoft.com/office/drawing/2014/main" id="{DFADDBC3-7317-4D05-BBCE-5B79A27A9295}"/>
               </a:ext>
             </a:extLst>
           </p:cNvPr>
-          <p:cNvSpPr>
-            <a:spLocks noGrp="1"/>
-          </p:cNvSpPr>
-          <p:nvPr>
-            <p:ph idx="1"/>
-          </p:nvPr>
+          <p:cNvSpPr/>
+          <p:nvPr/>
         </p:nvSpPr>
         <p:spPr>
           <a:xfrm>
-            <a:off x="457200" y="1197405"/>
-            <a:ext cx="7238999" cy="3576168"/>
+            <a:off x="4191000" y="1657350"/>
+            <a:ext cx="2057400" cy="907052"/>
           </a:xfrm>
+          <a:prstGeom prst="rect">
+            <a:avLst/>
+          </a:prstGeom>
+          <a:solidFill>
+            <a:schemeClr val="accent2">
+              <a:lumMod val="20000"/>
+              <a:lumOff val="80000"/>
+            </a:schemeClr>
+          </a:solidFill>
         </p:spPr>
+        <p:style>
+          <a:lnRef idx="2">
+            <a:schemeClr val="accent1">
+              <a:shade val="50000"/>
+            </a:schemeClr>
+          </a:lnRef>
+          <a:fillRef idx="1">
+            <a:schemeClr val="accent1"/>
+          </a:fillRef>
+          <a:effectRef idx="0">
+            <a:schemeClr val="accent1"/>
+          </a:effectRef>
+          <a:fontRef idx="minor">
+            <a:schemeClr val="lt1"/>
+          </a:fontRef>
+        </p:style>
         <p:txBody>
-          <a:bodyPr>
-            <a:normAutofit fontScale="85000" lnSpcReduction="10000"/>
-          </a:bodyPr>
+          <a:bodyPr rtlCol="0" anchor="ctr"/>
           <a:lstStyle/>
           <a:p>
+            <a:pPr algn="ctr"/>
             <a:r>
               <a:rPr lang="en-US" dirty="0"/>
-              <a:t>I may have left you with the impression class code </a:t>
-            </a:r>
-            <a:r>
-              <a:rPr lang="en-US" b="1" i="1" dirty="0"/>
-              <a:t>needs</a:t>
-            </a:r>
-            <a:r>
-              <a:rPr lang="en-US" dirty="0"/>
-              <a:t> to be in separate files. </a:t>
-            </a:r>
-            <a:r>
-              <a:rPr lang="en-US" b="1" i="1" dirty="0"/>
-              <a:t>This is not so ...</a:t>
-            </a:r>
-          </a:p>
-          <a:p>
-            <a:r>
-              <a:rPr lang="en-US" dirty="0"/>
-              <a:t>You </a:t>
-            </a:r>
-            <a:r>
-              <a:rPr lang="en-US" b="1" dirty="0"/>
-              <a:t>could</a:t>
-            </a:r>
-            <a:r>
-              <a:rPr lang="en-US" dirty="0"/>
-              <a:t> put class code right in your sketch</a:t>
-            </a:r>
-          </a:p>
-          <a:p>
-            <a:r>
-              <a:rPr lang="en-US" dirty="0"/>
-              <a:t>Yes – there is only one file to maintain.</a:t>
-            </a:r>
-          </a:p>
-          <a:p>
-            <a:r>
-              <a:rPr lang="en-US" dirty="0"/>
-              <a:t>But lose a key advantage – libraries and code sharing</a:t>
-            </a:r>
-          </a:p>
-          <a:p>
-            <a:r>
-              <a:rPr lang="en-US" dirty="0"/>
-              <a:t>And a big drawback is that the hidden complexity is now back in plain view.</a:t>
-            </a:r>
-          </a:p>
-          <a:p>
-            <a:r>
-              <a:rPr lang="en-US" dirty="0"/>
-              <a:t>I did not mention it last time as it is not typical to put all code in one file but it can be done.</a:t>
+              <a:t>Header File</a:t>
             </a:r>
           </a:p>
         </p:txBody>
       </p:sp>
+      <p:sp>
+        <p:nvSpPr>
+          <p:cNvPr id="11" name="Rectangle 10">
+            <a:extLst>
+              <a:ext uri="{FF2B5EF4-FFF2-40B4-BE49-F238E27FC236}">
+                <a16:creationId xmlns:a16="http://schemas.microsoft.com/office/drawing/2014/main" id="{D9965A67-64E0-4178-82EC-A604ADD32FE2}"/>
+              </a:ext>
+            </a:extLst>
+          </p:cNvPr>
+          <p:cNvSpPr/>
+          <p:nvPr/>
+        </p:nvSpPr>
+        <p:spPr>
+          <a:xfrm>
+            <a:off x="4191000" y="2610123"/>
+            <a:ext cx="2057400" cy="1219200"/>
+          </a:xfrm>
+          <a:prstGeom prst="rect">
+            <a:avLst/>
+          </a:prstGeom>
+          <a:solidFill>
+            <a:schemeClr val="accent2">
+              <a:lumMod val="40000"/>
+              <a:lumOff val="60000"/>
+            </a:schemeClr>
+          </a:solidFill>
+        </p:spPr>
+        <p:style>
+          <a:lnRef idx="2">
+            <a:schemeClr val="accent1">
+              <a:shade val="50000"/>
+            </a:schemeClr>
+          </a:lnRef>
+          <a:fillRef idx="1">
+            <a:schemeClr val="accent1"/>
+          </a:fillRef>
+          <a:effectRef idx="0">
+            <a:schemeClr val="accent1"/>
+          </a:effectRef>
+          <a:fontRef idx="minor">
+            <a:schemeClr val="lt1"/>
+          </a:fontRef>
+        </p:style>
+        <p:txBody>
+          <a:bodyPr rtlCol="0" anchor="ctr"/>
+          <a:lstStyle/>
+          <a:p>
+            <a:pPr algn="ctr"/>
+            <a:r>
+              <a:rPr lang="en-US" dirty="0"/>
+              <a:t>CPP File</a:t>
+            </a:r>
+          </a:p>
+        </p:txBody>
+      </p:sp>
+      <p:sp>
+        <p:nvSpPr>
+          <p:cNvPr id="7" name="Rectangle 6">
+            <a:extLst>
+              <a:ext uri="{FF2B5EF4-FFF2-40B4-BE49-F238E27FC236}">
+                <a16:creationId xmlns:a16="http://schemas.microsoft.com/office/drawing/2014/main" id="{861D812D-1B8E-4382-B877-29F161D7FBEA}"/>
+              </a:ext>
+            </a:extLst>
+          </p:cNvPr>
+          <p:cNvSpPr/>
+          <p:nvPr/>
+        </p:nvSpPr>
+        <p:spPr>
+          <a:xfrm>
+            <a:off x="1219200" y="1986643"/>
+            <a:ext cx="1524000" cy="304800"/>
+          </a:xfrm>
+          <a:prstGeom prst="rect">
+            <a:avLst/>
+          </a:prstGeom>
+          <a:solidFill>
+            <a:schemeClr val="accent2">
+              <a:lumMod val="20000"/>
+              <a:lumOff val="80000"/>
+            </a:schemeClr>
+          </a:solidFill>
+        </p:spPr>
+        <p:style>
+          <a:lnRef idx="2">
+            <a:schemeClr val="accent1">
+              <a:shade val="50000"/>
+            </a:schemeClr>
+          </a:lnRef>
+          <a:fillRef idx="1">
+            <a:schemeClr val="accent1"/>
+          </a:fillRef>
+          <a:effectRef idx="0">
+            <a:schemeClr val="accent1"/>
+          </a:effectRef>
+          <a:fontRef idx="minor">
+            <a:schemeClr val="lt1"/>
+          </a:fontRef>
+        </p:style>
+        <p:txBody>
+          <a:bodyPr rtlCol="0" anchor="ctr"/>
+          <a:lstStyle/>
+          <a:p>
+            <a:r>
+              <a:rPr lang="en-US" sz="1200" dirty="0">
+                <a:solidFill>
+                  <a:srgbClr val="FF0000"/>
+                </a:solidFill>
+              </a:rPr>
+              <a:t>#include header File</a:t>
+            </a:r>
+          </a:p>
+        </p:txBody>
+      </p:sp>
+      <p:sp>
+        <p:nvSpPr>
+          <p:cNvPr id="8" name="Rectangle 7">
+            <a:extLst>
+              <a:ext uri="{FF2B5EF4-FFF2-40B4-BE49-F238E27FC236}">
+                <a16:creationId xmlns:a16="http://schemas.microsoft.com/office/drawing/2014/main" id="{C10D932C-861E-4942-B493-7E5267E103D8}"/>
+              </a:ext>
+            </a:extLst>
+          </p:cNvPr>
+          <p:cNvSpPr/>
+          <p:nvPr/>
+        </p:nvSpPr>
+        <p:spPr>
+          <a:xfrm>
+            <a:off x="4267200" y="2647950"/>
+            <a:ext cx="1524000" cy="304800"/>
+          </a:xfrm>
+          <a:prstGeom prst="rect">
+            <a:avLst/>
+          </a:prstGeom>
+          <a:solidFill>
+            <a:schemeClr val="accent2">
+              <a:lumMod val="20000"/>
+              <a:lumOff val="80000"/>
+            </a:schemeClr>
+          </a:solidFill>
+        </p:spPr>
+        <p:style>
+          <a:lnRef idx="2">
+            <a:schemeClr val="accent1">
+              <a:shade val="50000"/>
+            </a:schemeClr>
+          </a:lnRef>
+          <a:fillRef idx="1">
+            <a:schemeClr val="accent1"/>
+          </a:fillRef>
+          <a:effectRef idx="0">
+            <a:schemeClr val="accent1"/>
+          </a:effectRef>
+          <a:fontRef idx="minor">
+            <a:schemeClr val="lt1"/>
+          </a:fontRef>
+        </p:style>
+        <p:txBody>
+          <a:bodyPr rtlCol="0" anchor="ctr"/>
+          <a:lstStyle/>
+          <a:p>
+            <a:r>
+              <a:rPr lang="en-US" sz="1200" dirty="0">
+                <a:solidFill>
+                  <a:srgbClr val="FF0000"/>
+                </a:solidFill>
+              </a:rPr>
+              <a:t>#include header File</a:t>
+            </a:r>
+          </a:p>
+        </p:txBody>
+      </p:sp>
+      <p:grpSp>
+        <p:nvGrpSpPr>
+          <p:cNvPr id="6" name="Group 5">
+            <a:extLst>
+              <a:ext uri="{FF2B5EF4-FFF2-40B4-BE49-F238E27FC236}">
+                <a16:creationId xmlns:a16="http://schemas.microsoft.com/office/drawing/2014/main" id="{A5D2415B-3FD2-498A-89BF-B907DAA51A24}"/>
+              </a:ext>
+            </a:extLst>
+          </p:cNvPr>
+          <p:cNvGrpSpPr/>
+          <p:nvPr/>
+        </p:nvGrpSpPr>
+        <p:grpSpPr>
+          <a:xfrm>
+            <a:off x="6021977" y="1504950"/>
+            <a:ext cx="1598023" cy="2748099"/>
+            <a:chOff x="6021977" y="1662249"/>
+            <a:chExt cx="1598023" cy="2590800"/>
+          </a:xfrm>
+        </p:grpSpPr>
+        <p:sp>
+          <p:nvSpPr>
+            <p:cNvPr id="3" name="Right Brace 2">
+              <a:extLst>
+                <a:ext uri="{FF2B5EF4-FFF2-40B4-BE49-F238E27FC236}">
+                  <a16:creationId xmlns:a16="http://schemas.microsoft.com/office/drawing/2014/main" id="{6E974F93-E3AC-47BE-A533-F235405E1CE6}"/>
+                </a:ext>
+              </a:extLst>
+            </p:cNvPr>
+            <p:cNvSpPr/>
+            <p:nvPr/>
+          </p:nvSpPr>
+          <p:spPr>
+            <a:xfrm>
+              <a:off x="6021977" y="1662249"/>
+              <a:ext cx="685800" cy="2590800"/>
+            </a:xfrm>
+            <a:prstGeom prst="rightBrace">
+              <a:avLst/>
+            </a:prstGeom>
+            <a:ln w="38100">
+              <a:solidFill>
+                <a:srgbClr val="FF0000"/>
+              </a:solidFill>
+            </a:ln>
+          </p:spPr>
+          <p:style>
+            <a:lnRef idx="1">
+              <a:schemeClr val="accent1"/>
+            </a:lnRef>
+            <a:fillRef idx="0">
+              <a:schemeClr val="accent1"/>
+            </a:fillRef>
+            <a:effectRef idx="0">
+              <a:schemeClr val="accent1"/>
+            </a:effectRef>
+            <a:fontRef idx="minor">
+              <a:schemeClr val="tx1"/>
+            </a:fontRef>
+          </p:style>
+          <p:txBody>
+            <a:bodyPr rtlCol="0" anchor="ctr"/>
+            <a:lstStyle/>
+            <a:p>
+              <a:pPr algn="ctr"/>
+              <a:endParaRPr lang="en-US">
+                <a:solidFill>
+                  <a:srgbClr val="FF0000"/>
+                </a:solidFill>
+              </a:endParaRPr>
+            </a:p>
+          </p:txBody>
+        </p:sp>
+        <p:sp>
+          <p:nvSpPr>
+            <p:cNvPr id="5" name="TextBox 4">
+              <a:extLst>
+                <a:ext uri="{FF2B5EF4-FFF2-40B4-BE49-F238E27FC236}">
+                  <a16:creationId xmlns:a16="http://schemas.microsoft.com/office/drawing/2014/main" id="{3B4ECFF8-6B43-49D7-86CF-6A7B0986037B}"/>
+                </a:ext>
+              </a:extLst>
+            </p:cNvPr>
+            <p:cNvSpPr txBox="1"/>
+            <p:nvPr/>
+          </p:nvSpPr>
+          <p:spPr>
+            <a:xfrm>
+              <a:off x="6479177" y="2607129"/>
+              <a:ext cx="1140823" cy="646331"/>
+            </a:xfrm>
+            <a:prstGeom prst="rect">
+              <a:avLst/>
+            </a:prstGeom>
+            <a:noFill/>
+          </p:spPr>
+          <p:txBody>
+            <a:bodyPr wrap="square" rtlCol="0">
+              <a:spAutoFit/>
+            </a:bodyPr>
+            <a:lstStyle/>
+            <a:p>
+              <a:r>
+                <a:rPr lang="en-US" dirty="0">
+                  <a:solidFill>
+                    <a:srgbClr val="FF0000"/>
+                  </a:solidFill>
+                </a:rPr>
+                <a:t>Matched</a:t>
+              </a:r>
+            </a:p>
+            <a:p>
+              <a:r>
+                <a:rPr lang="en-US" dirty="0">
+                  <a:solidFill>
+                    <a:srgbClr val="FF0000"/>
+                  </a:solidFill>
+                </a:rPr>
+                <a:t>Set</a:t>
+              </a:r>
+            </a:p>
+          </p:txBody>
+        </p:sp>
+      </p:grpSp>
     </p:spTree>
     <p:extLst>
       <p:ext uri="{BB962C8B-B14F-4D97-AF65-F5344CB8AC3E}">
-        <p14:creationId xmlns:p14="http://schemas.microsoft.com/office/powerpoint/2010/main" val="4001298897"/>
+        <p14:creationId xmlns:p14="http://schemas.microsoft.com/office/powerpoint/2010/main" val="2612453022"/>
       </p:ext>
     </p:extLst>
   </p:cSld>
@@ -39894,7 +39975,7 @@
                             </p:stCondLst>
                             <p:childTnLst>
                               <p:par>
-                                <p:cTn id="5" presetID="1" presetClass="entr" presetSubtype="0" fill="hold" nodeType="clickEffect">
+                                <p:cTn id="5" presetID="10" presetClass="entr" presetSubtype="0" fill="hold" nodeType="clickEffect">
                                   <p:stCondLst>
                                     <p:cond delay="0"/>
                                   </p:stCondLst>
@@ -39907,62 +39988,7 @@
                                           </p:stCondLst>
                                         </p:cTn>
                                         <p:tgtEl>
-                                          <p:spTgt spid="3">
-                                            <p:txEl>
-                                              <p:pRg st="0" end="0"/>
-                                            </p:txEl>
-                                          </p:spTgt>
-                                        </p:tgtEl>
-                                        <p:attrNameLst>
-                                          <p:attrName>style.visibility</p:attrName>
-                                        </p:attrNameLst>
-                                      </p:cBhvr>
-                                      <p:to>
-                                        <p:strVal val="visible"/>
-                                      </p:to>
-                                    </p:set>
-                                  </p:childTnLst>
-                                  <p:subTnLst>
-                                    <p:animClr clrSpc="rgb" dir="cw">
-                                      <p:cBhvr override="childStyle">
-                                        <p:cTn dur="1" fill="hold" display="0" masterRel="nextClick" afterEffect="1"/>
-                                        <p:tgtEl>
-                                          <p:spTgt spid="3">
-                                            <p:txEl>
-                                              <p:pRg st="0" end="0"/>
-                                            </p:txEl>
-                                          </p:spTgt>
-                                        </p:tgtEl>
-                                        <p:attrNameLst>
-                                          <p:attrName>ppt_c</p:attrName>
-                                        </p:attrNameLst>
-                                      </p:cBhvr>
-                                      <p:to>
-                                        <a:schemeClr val="bg2"/>
-                                      </p:to>
-                                    </p:animClr>
-                                  </p:subTnLst>
-                                </p:cTn>
-                              </p:par>
-                              <p:par>
-                                <p:cTn id="7" presetID="10" presetClass="entr" presetSubtype="0" fill="hold" nodeType="withEffect">
-                                  <p:stCondLst>
-                                    <p:cond delay="0"/>
-                                  </p:stCondLst>
-                                  <p:childTnLst>
-                                    <p:set>
-                                      <p:cBhvr>
-                                        <p:cTn id="8" dur="1" fill="hold">
-                                          <p:stCondLst>
-                                            <p:cond delay="0"/>
-                                          </p:stCondLst>
-                                        </p:cTn>
-                                        <p:tgtEl>
-                                          <p:spTgt spid="3">
-                                            <p:txEl>
-                                              <p:pRg st="5" end="5"/>
-                                            </p:txEl>
-                                          </p:spTgt>
+                                          <p:spTgt spid="6"/>
                                         </p:tgtEl>
                                         <p:attrNameLst>
                                           <p:attrName>style.visibility</p:attrName>
@@ -39974,37 +40000,13 @@
                                     </p:set>
                                     <p:animEffect transition="in" filter="fade">
                                       <p:cBhvr>
-                                        <p:cTn id="9" dur="500"/>
+                                        <p:cTn id="7" dur="500"/>
                                         <p:tgtEl>
-                                          <p:spTgt spid="3">
-                                            <p:txEl>
-                                              <p:pRg st="5" end="5"/>
-                                            </p:txEl>
-                                          </p:spTgt>
+                                          <p:spTgt spid="6"/>
                                         </p:tgtEl>
                                       </p:cBhvr>
                                     </p:animEffect>
                                   </p:childTnLst>
-                                  <p:subTnLst>
-                                    <p:animClr clrSpc="rgb" dir="cw">
-                                      <p:cBhvr override="childStyle">
-                                        <p:cTn dur="1" fill="hold" display="0" masterRel="nextClick" afterEffect="1"/>
-                                        <p:tgtEl>
-                                          <p:spTgt spid="3">
-                                            <p:txEl>
-                                              <p:pRg st="5" end="5"/>
-                                            </p:txEl>
-                                          </p:spTgt>
-                                        </p:tgtEl>
-                                        <p:attrNameLst>
-                                          <p:attrName>ppt_c</p:attrName>
-                                        </p:attrNameLst>
-                                      </p:cBhvr>
-                                      <p:to>
-                                        <a:schemeClr val="bg2"/>
-                                      </p:to>
-                                    </p:animClr>
-                                  </p:subTnLst>
                                 </p:cTn>
                               </p:par>
                             </p:childTnLst>
@@ -40014,36 +40016,32 @@
                     </p:cTn>
                   </p:par>
                   <p:par>
-                    <p:cTn id="10" fill="hold">
+                    <p:cTn id="8" fill="hold">
                       <p:stCondLst>
                         <p:cond delay="indefinite"/>
                       </p:stCondLst>
                       <p:childTnLst>
                         <p:par>
-                          <p:cTn id="11" fill="hold">
+                          <p:cTn id="9" fill="hold">
                             <p:stCondLst>
                               <p:cond delay="0"/>
                             </p:stCondLst>
                             <p:childTnLst>
                               <p:par>
-                                <p:cTn id="12" presetID="10" presetClass="entr" presetSubtype="0" fill="hold" nodeType="clickEffect">
+                                <p:cTn id="10" presetID="42" presetClass="entr" presetSubtype="0" fill="hold" grpId="0" nodeType="clickEffect">
                                   <p:stCondLst>
                                     <p:cond delay="0"/>
                                   </p:stCondLst>
                                   <p:childTnLst>
                                     <p:set>
                                       <p:cBhvr>
-                                        <p:cTn id="13" dur="1" fill="hold">
+                                        <p:cTn id="11" dur="1" fill="hold">
                                           <p:stCondLst>
                                             <p:cond delay="0"/>
                                           </p:stCondLst>
                                         </p:cTn>
                                         <p:tgtEl>
-                                          <p:spTgt spid="3">
-                                            <p:txEl>
-                                              <p:pRg st="1" end="1"/>
-                                            </p:txEl>
-                                          </p:spTgt>
+                                          <p:spTgt spid="7"/>
                                         </p:tgtEl>
                                         <p:attrNameLst>
                                           <p:attrName>style.visibility</p:attrName>
@@ -40055,16 +40053,58 @@
                                     </p:set>
                                     <p:animEffect transition="in" filter="fade">
                                       <p:cBhvr>
-                                        <p:cTn id="14" dur="500"/>
+                                        <p:cTn id="12" dur="1000"/>
                                         <p:tgtEl>
-                                          <p:spTgt spid="3">
-                                            <p:txEl>
-                                              <p:pRg st="1" end="1"/>
-                                            </p:txEl>
-                                          </p:spTgt>
+                                          <p:spTgt spid="7"/>
                                         </p:tgtEl>
                                       </p:cBhvr>
                                     </p:animEffect>
+                                    <p:anim calcmode="lin" valueType="num">
+                                      <p:cBhvr>
+                                        <p:cTn id="13" dur="1000" fill="hold"/>
+                                        <p:tgtEl>
+                                          <p:spTgt spid="7"/>
+                                        </p:tgtEl>
+                                        <p:attrNameLst>
+                                          <p:attrName>ppt_x</p:attrName>
+                                        </p:attrNameLst>
+                                      </p:cBhvr>
+                                      <p:tavLst>
+                                        <p:tav tm="0">
+                                          <p:val>
+                                            <p:strVal val="#ppt_x"/>
+                                          </p:val>
+                                        </p:tav>
+                                        <p:tav tm="100000">
+                                          <p:val>
+                                            <p:strVal val="#ppt_x"/>
+                                          </p:val>
+                                        </p:tav>
+                                      </p:tavLst>
+                                    </p:anim>
+                                    <p:anim calcmode="lin" valueType="num">
+                                      <p:cBhvr>
+                                        <p:cTn id="14" dur="1000" fill="hold"/>
+                                        <p:tgtEl>
+                                          <p:spTgt spid="7"/>
+                                        </p:tgtEl>
+                                        <p:attrNameLst>
+                                          <p:attrName>ppt_y</p:attrName>
+                                        </p:attrNameLst>
+                                      </p:cBhvr>
+                                      <p:tavLst>
+                                        <p:tav tm="0">
+                                          <p:val>
+                                            <p:strVal val="#ppt_y+.1"/>
+                                          </p:val>
+                                        </p:tav>
+                                        <p:tav tm="100000">
+                                          <p:val>
+                                            <p:strVal val="#ppt_y"/>
+                                          </p:val>
+                                        </p:tav>
+                                      </p:tavLst>
+                                    </p:anim>
                                   </p:childTnLst>
                                 </p:cTn>
                               </p:par>
@@ -40087,7 +40127,7 @@
                             </p:stCondLst>
                             <p:childTnLst>
                               <p:par>
-                                <p:cTn id="17" presetID="10" presetClass="entr" presetSubtype="0" fill="hold" nodeType="clickEffect">
+                                <p:cTn id="17" presetID="42" presetClass="entr" presetSubtype="0" fill="hold" grpId="0" nodeType="clickEffect">
                                   <p:stCondLst>
                                     <p:cond delay="0"/>
                                   </p:stCondLst>
@@ -40100,11 +40140,7 @@
                                           </p:stCondLst>
                                         </p:cTn>
                                         <p:tgtEl>
-                                          <p:spTgt spid="3">
-                                            <p:txEl>
-                                              <p:pRg st="2" end="2"/>
-                                            </p:txEl>
-                                          </p:spTgt>
+                                          <p:spTgt spid="8"/>
                                         </p:tgtEl>
                                         <p:attrNameLst>
                                           <p:attrName>style.visibility</p:attrName>
@@ -40116,138 +40152,58 @@
                                     </p:set>
                                     <p:animEffect transition="in" filter="fade">
                                       <p:cBhvr>
-                                        <p:cTn id="19" dur="500"/>
+                                        <p:cTn id="19" dur="1000"/>
                                         <p:tgtEl>
-                                          <p:spTgt spid="3">
-                                            <p:txEl>
-                                              <p:pRg st="2" end="2"/>
-                                            </p:txEl>
-                                          </p:spTgt>
+                                          <p:spTgt spid="8"/>
                                         </p:tgtEl>
                                       </p:cBhvr>
                                     </p:animEffect>
-                                  </p:childTnLst>
-                                </p:cTn>
-                              </p:par>
-                            </p:childTnLst>
-                          </p:cTn>
-                        </p:par>
-                      </p:childTnLst>
-                    </p:cTn>
-                  </p:par>
-                  <p:par>
-                    <p:cTn id="20" fill="hold">
-                      <p:stCondLst>
-                        <p:cond delay="indefinite"/>
-                      </p:stCondLst>
-                      <p:childTnLst>
-                        <p:par>
-                          <p:cTn id="21" fill="hold">
-                            <p:stCondLst>
-                              <p:cond delay="0"/>
-                            </p:stCondLst>
-                            <p:childTnLst>
-                              <p:par>
-                                <p:cTn id="22" presetID="10" presetClass="entr" presetSubtype="0" fill="hold" nodeType="clickEffect">
-                                  <p:stCondLst>
-                                    <p:cond delay="0"/>
-                                  </p:stCondLst>
-                                  <p:childTnLst>
-                                    <p:set>
+                                    <p:anim calcmode="lin" valueType="num">
                                       <p:cBhvr>
-                                        <p:cTn id="23" dur="1" fill="hold">
-                                          <p:stCondLst>
-                                            <p:cond delay="0"/>
-                                          </p:stCondLst>
-                                        </p:cTn>
+                                        <p:cTn id="20" dur="1000" fill="hold"/>
                                         <p:tgtEl>
-                                          <p:spTgt spid="3">
-                                            <p:txEl>
-                                              <p:pRg st="3" end="3"/>
-                                            </p:txEl>
-                                          </p:spTgt>
+                                          <p:spTgt spid="8"/>
                                         </p:tgtEl>
                                         <p:attrNameLst>
-                                          <p:attrName>style.visibility</p:attrName>
+                                          <p:attrName>ppt_x</p:attrName>
                                         </p:attrNameLst>
                                       </p:cBhvr>
-                                      <p:to>
-                                        <p:strVal val="visible"/>
-                                      </p:to>
-                                    </p:set>
-                                    <p:animEffect transition="in" filter="fade">
+                                      <p:tavLst>
+                                        <p:tav tm="0">
+                                          <p:val>
+                                            <p:strVal val="#ppt_x"/>
+                                          </p:val>
+                                        </p:tav>
+                                        <p:tav tm="100000">
+                                          <p:val>
+                                            <p:strVal val="#ppt_x"/>
+                                          </p:val>
+                                        </p:tav>
+                                      </p:tavLst>
+                                    </p:anim>
+                                    <p:anim calcmode="lin" valueType="num">
                                       <p:cBhvr>
-                                        <p:cTn id="24" dur="500"/>
+                                        <p:cTn id="21" dur="1000" fill="hold"/>
                                         <p:tgtEl>
-                                          <p:spTgt spid="3">
-                                            <p:txEl>
-                                              <p:pRg st="3" end="3"/>
-                                            </p:txEl>
-                                          </p:spTgt>
-                                        </p:tgtEl>
-                                      </p:cBhvr>
-                                    </p:animEffect>
-                                  </p:childTnLst>
-                                </p:cTn>
-                              </p:par>
-                            </p:childTnLst>
-                          </p:cTn>
-                        </p:par>
-                      </p:childTnLst>
-                    </p:cTn>
-                  </p:par>
-                  <p:par>
-                    <p:cTn id="25" fill="hold">
-                      <p:stCondLst>
-                        <p:cond delay="indefinite"/>
-                      </p:stCondLst>
-                      <p:childTnLst>
-                        <p:par>
-                          <p:cTn id="26" fill="hold">
-                            <p:stCondLst>
-                              <p:cond delay="0"/>
-                            </p:stCondLst>
-                            <p:childTnLst>
-                              <p:par>
-                                <p:cTn id="27" presetID="10" presetClass="entr" presetSubtype="0" fill="hold" nodeType="clickEffect">
-                                  <p:stCondLst>
-                                    <p:cond delay="0"/>
-                                  </p:stCondLst>
-                                  <p:childTnLst>
-                                    <p:set>
-                                      <p:cBhvr>
-                                        <p:cTn id="28" dur="1" fill="hold">
-                                          <p:stCondLst>
-                                            <p:cond delay="0"/>
-                                          </p:stCondLst>
-                                        </p:cTn>
-                                        <p:tgtEl>
-                                          <p:spTgt spid="3">
-                                            <p:txEl>
-                                              <p:pRg st="4" end="4"/>
-                                            </p:txEl>
-                                          </p:spTgt>
+                                          <p:spTgt spid="8"/>
                                         </p:tgtEl>
                                         <p:attrNameLst>
-                                          <p:attrName>style.visibility</p:attrName>
+                                          <p:attrName>ppt_y</p:attrName>
                                         </p:attrNameLst>
                                       </p:cBhvr>
-                                      <p:to>
-                                        <p:strVal val="visible"/>
-                                      </p:to>
-                                    </p:set>
-                                    <p:animEffect transition="in" filter="fade">
-                                      <p:cBhvr>
-                                        <p:cTn id="29" dur="500"/>
-                                        <p:tgtEl>
-                                          <p:spTgt spid="3">
-                                            <p:txEl>
-                                              <p:pRg st="4" end="4"/>
-                                            </p:txEl>
-                                          </p:spTgt>
-                                        </p:tgtEl>
-                                      </p:cBhvr>
-                                    </p:animEffect>
+                                      <p:tavLst>
+                                        <p:tav tm="0">
+                                          <p:val>
+                                            <p:strVal val="#ppt_y+.1"/>
+                                          </p:val>
+                                        </p:tav>
+                                        <p:tav tm="100000">
+                                          <p:val>
+                                            <p:strVal val="#ppt_y"/>
+                                          </p:val>
+                                        </p:tav>
+                                      </p:tavLst>
+                                    </p:anim>
                                   </p:childTnLst>
                                 </p:cTn>
                               </p:par>
@@ -40278,6 +40234,10 @@
         </p:cTn>
       </p:par>
     </p:tnLst>
+    <p:bldLst>
+      <p:bldP spid="7" grpId="0" animBg="1"/>
+      <p:bldP spid="8" grpId="0" animBg="1"/>
+    </p:bldLst>
   </p:timing>
 </p:sld>
 </file>

</xml_diff>